<commit_message>
ajuste texto en mapa_ma_10_01-co
</commit_message>
<xml_diff>
--- a/fuentes/contenidos/grado10/guion01/MapaConceptualMA_10_01_CO.pptx
+++ b/fuentes/contenidos/grado10/guion01/MapaConceptualMA_10_01_CO.pptx
@@ -394,7 +394,7 @@
           <a:p>
             <a:fld id="{5001C876-01F7-4317-94B9-1AE222133113}" type="datetimeFigureOut">
               <a:rPr lang="es-ES" smtClean="0"/>
-              <a:t>25/07/2016</a:t>
+              <a:t>26/07/2016</a:t>
             </a:fld>
             <a:endParaRPr lang="es-ES"/>
           </a:p>
@@ -997,8 +997,8 @@
         </p:nvSpPr>
         <p:spPr>
           <a:xfrm>
-            <a:off x="1456740" y="1119497"/>
-            <a:ext cx="1444410" cy="620160"/>
+            <a:off x="971916" y="1168832"/>
+            <a:ext cx="1106775" cy="281864"/>
           </a:xfrm>
           <a:prstGeom prst="rect">
             <a:avLst/>
@@ -1039,12 +1039,16 @@
           <a:p>
             <a:pPr algn="ctr"/>
             <a:r>
-              <a:rPr lang="es-ES" sz="1050" b="1" dirty="0">
-                <a:latin typeface="Arial" panose="020B0604020202020204" pitchFamily="34" charset="0"/>
-                <a:cs typeface="Arial" panose="020B0604020202020204" pitchFamily="34" charset="0"/>
-              </a:rPr>
-              <a:t>Las relaciones que se establecen entre dos variables</a:t>
-            </a:r>
+              <a:rPr lang="es-ES" sz="1050" b="1" dirty="0" smtClean="0">
+                <a:latin typeface="Arial" panose="020B0604020202020204" pitchFamily="34" charset="0"/>
+                <a:cs typeface="Arial" panose="020B0604020202020204" pitchFamily="34" charset="0"/>
+              </a:rPr>
+              <a:t>Relaciones</a:t>
+            </a:r>
+            <a:endParaRPr lang="es-ES" sz="1050" b="1" dirty="0">
+              <a:latin typeface="Arial" panose="020B0604020202020204" pitchFamily="34" charset="0"/>
+              <a:cs typeface="Arial" panose="020B0604020202020204" pitchFamily="34" charset="0"/>
+            </a:endParaRPr>
           </a:p>
         </p:txBody>
       </p:sp>
@@ -1055,14 +1059,12 @@
           <p:nvPr/>
         </p:nvCxnSpPr>
         <p:spPr>
-          <a:xfrm rot="5400000">
-            <a:off x="3338140" y="-763435"/>
-            <a:ext cx="166785" cy="2567000"/>
-          </a:xfrm>
-          <a:prstGeom prst="bentConnector3">
-            <a:avLst>
-              <a:gd name="adj1" fmla="val 50000"/>
-            </a:avLst>
+          <a:xfrm rot="10800000" flipV="1">
+            <a:off x="1440282" y="546034"/>
+            <a:ext cx="3522965" cy="141321"/>
+          </a:xfrm>
+          <a:prstGeom prst="bentConnector2">
+            <a:avLst/>
           </a:prstGeom>
           <a:ln w="12700">
             <a:solidFill>
@@ -1087,14 +1089,14 @@
       </p:cxnSp>
       <p:sp>
         <p:nvSpPr>
-          <p:cNvPr id="19" name="CuadroTexto 18" descr="Conector entre nodos" title="conector"/>
+          <p:cNvPr id="130" name="CuadroTexto 129" descr="Conector entre nodos" title="conector"/>
           <p:cNvSpPr txBox="1"/>
           <p:nvPr/>
         </p:nvSpPr>
         <p:spPr>
           <a:xfrm>
-            <a:off x="899829" y="2124359"/>
-            <a:ext cx="995352" cy="230832"/>
+            <a:off x="1233909" y="729689"/>
+            <a:ext cx="432746" cy="230832"/>
           </a:xfrm>
           <a:prstGeom prst="rect">
             <a:avLst/>
@@ -1113,402 +1115,7 @@
                 <a:latin typeface="Arial" panose="020B0604020202020204" pitchFamily="34" charset="0"/>
                 <a:cs typeface="Arial" panose="020B0604020202020204" pitchFamily="34" charset="0"/>
               </a:rPr>
-              <a:t>denominadas</a:t>
-            </a:r>
-          </a:p>
-        </p:txBody>
-      </p:sp>
-      <p:sp>
-        <p:nvSpPr>
-          <p:cNvPr id="44" name="Rectángulo 43" descr="Nodo de segundo nivel" title="Nodo02"/>
-          <p:cNvSpPr/>
-          <p:nvPr/>
-        </p:nvSpPr>
-        <p:spPr>
-          <a:xfrm>
-            <a:off x="433838" y="2554341"/>
-            <a:ext cx="916810" cy="342440"/>
-          </a:xfrm>
-          <a:prstGeom prst="rect">
-            <a:avLst/>
-          </a:prstGeom>
-          <a:solidFill>
-            <a:schemeClr val="bg2">
-              <a:lumMod val="50000"/>
-            </a:schemeClr>
-          </a:solidFill>
-          <a:ln>
-            <a:solidFill>
-              <a:schemeClr val="tx1"/>
-            </a:solidFill>
-          </a:ln>
-        </p:spPr>
-        <p:style>
-          <a:lnRef idx="2">
-            <a:schemeClr val="accent6"/>
-          </a:lnRef>
-          <a:fillRef idx="1">
-            <a:schemeClr val="lt1"/>
-          </a:fillRef>
-          <a:effectRef idx="0">
-            <a:schemeClr val="accent6"/>
-          </a:effectRef>
-          <a:fontRef idx="minor">
-            <a:schemeClr val="dk1"/>
-          </a:fontRef>
-        </p:style>
-        <p:txBody>
-          <a:bodyPr rtlCol="0" anchor="ctr"/>
-          <a:lstStyle/>
-          <a:p>
-            <a:pPr algn="ctr"/>
-            <a:r>
-              <a:rPr lang="es-ES" sz="900" dirty="0">
-                <a:solidFill>
-                  <a:schemeClr val="bg1"/>
-                </a:solidFill>
-                <a:latin typeface="Arial" panose="020B0604020202020204" pitchFamily="34" charset="0"/>
-                <a:cs typeface="Arial" panose="020B0604020202020204" pitchFamily="34" charset="0"/>
-              </a:rPr>
-              <a:t>variable independiente</a:t>
-            </a:r>
-          </a:p>
-        </p:txBody>
-      </p:sp>
-      <p:sp>
-        <p:nvSpPr>
-          <p:cNvPr id="67" name="CuadroTexto 66" descr="Conector entre nodos" title="conector"/>
-          <p:cNvSpPr txBox="1"/>
-          <p:nvPr/>
-        </p:nvSpPr>
-        <p:spPr>
-          <a:xfrm>
-            <a:off x="507890" y="3010276"/>
-            <a:ext cx="937234" cy="230832"/>
-          </a:xfrm>
-          <a:prstGeom prst="rect">
-            <a:avLst/>
-          </a:prstGeom>
-          <a:noFill/>
-        </p:spPr>
-        <p:txBody>
-          <a:bodyPr wrap="square" rtlCol="0">
-            <a:spAutoFit/>
-          </a:bodyPr>
-          <a:lstStyle/>
-          <a:p>
-            <a:pPr algn="ctr"/>
-            <a:r>
-              <a:rPr lang="es-ES" sz="900" dirty="0">
-                <a:latin typeface="Arial" panose="020B0604020202020204" pitchFamily="34" charset="0"/>
-                <a:cs typeface="Arial" panose="020B0604020202020204" pitchFamily="34" charset="0"/>
-              </a:rPr>
-              <a:t>es aquella que</a:t>
-            </a:r>
-          </a:p>
-        </p:txBody>
-      </p:sp>
-      <p:cxnSp>
-        <p:nvCxnSpPr>
-          <p:cNvPr id="68" name="Conector angular 67"/>
-          <p:cNvCxnSpPr/>
-          <p:nvPr/>
-        </p:nvCxnSpPr>
-        <p:spPr>
-          <a:xfrm rot="5400000">
-            <a:off x="886264" y="2968748"/>
-            <a:ext cx="143026" cy="877"/>
-          </a:xfrm>
-          <a:prstGeom prst="bentConnector3">
-            <a:avLst>
-              <a:gd name="adj1" fmla="val 50000"/>
-            </a:avLst>
-          </a:prstGeom>
-          <a:ln w="12700">
-            <a:solidFill>
-              <a:schemeClr val="tx1"/>
-            </a:solidFill>
-          </a:ln>
-        </p:spPr>
-        <p:style>
-          <a:lnRef idx="1">
-            <a:schemeClr val="accent1"/>
-          </a:lnRef>
-          <a:fillRef idx="0">
-            <a:schemeClr val="accent1"/>
-          </a:fillRef>
-          <a:effectRef idx="0">
-            <a:schemeClr val="accent1"/>
-          </a:effectRef>
-          <a:fontRef idx="minor">
-            <a:schemeClr val="tx1"/>
-          </a:fontRef>
-        </p:style>
-      </p:cxnSp>
-      <p:sp>
-        <p:nvSpPr>
-          <p:cNvPr id="72" name="Rectángulo 71" descr="Nodo de tercer nivel" title="Nodo03"/>
-          <p:cNvSpPr/>
-          <p:nvPr/>
-        </p:nvSpPr>
-        <p:spPr>
-          <a:xfrm>
-            <a:off x="497086" y="3323312"/>
-            <a:ext cx="883571" cy="306143"/>
-          </a:xfrm>
-          <a:prstGeom prst="rect">
-            <a:avLst/>
-          </a:prstGeom>
-          <a:solidFill>
-            <a:schemeClr val="bg2">
-              <a:lumMod val="90000"/>
-            </a:schemeClr>
-          </a:solidFill>
-          <a:ln>
-            <a:solidFill>
-              <a:schemeClr val="tx1"/>
-            </a:solidFill>
-          </a:ln>
-        </p:spPr>
-        <p:style>
-          <a:lnRef idx="2">
-            <a:schemeClr val="accent6"/>
-          </a:lnRef>
-          <a:fillRef idx="1">
-            <a:schemeClr val="lt1"/>
-          </a:fillRef>
-          <a:effectRef idx="0">
-            <a:schemeClr val="accent6"/>
-          </a:effectRef>
-          <a:fontRef idx="minor">
-            <a:schemeClr val="dk1"/>
-          </a:fontRef>
-        </p:style>
-        <p:txBody>
-          <a:bodyPr rtlCol="0" anchor="ctr"/>
-          <a:lstStyle/>
-          <a:p>
-            <a:pPr algn="ctr"/>
-            <a:r>
-              <a:rPr lang="es-ES" sz="900" dirty="0">
-                <a:solidFill>
-                  <a:schemeClr val="tx1"/>
-                </a:solidFill>
-                <a:latin typeface="Arial" panose="020B0604020202020204" pitchFamily="34" charset="0"/>
-                <a:cs typeface="Arial" panose="020B0604020202020204" pitchFamily="34" charset="0"/>
-              </a:rPr>
-              <a:t>toma valores arbitrarios</a:t>
-            </a:r>
-          </a:p>
-        </p:txBody>
-      </p:sp>
-      <p:sp>
-        <p:nvSpPr>
-          <p:cNvPr id="73" name="Rectángulo 72" descr="Nodo de cuarto nivel&#10;" title="Nodo04"/>
-          <p:cNvSpPr/>
-          <p:nvPr/>
-        </p:nvSpPr>
-        <p:spPr>
-          <a:xfrm>
-            <a:off x="395548" y="4165766"/>
-            <a:ext cx="1042399" cy="344921"/>
-          </a:xfrm>
-          <a:prstGeom prst="rect">
-            <a:avLst/>
-          </a:prstGeom>
-          <a:solidFill>
-            <a:schemeClr val="bg1"/>
-          </a:solidFill>
-          <a:ln>
-            <a:solidFill>
-              <a:schemeClr val="tx1"/>
-            </a:solidFill>
-          </a:ln>
-        </p:spPr>
-        <p:style>
-          <a:lnRef idx="2">
-            <a:schemeClr val="accent6"/>
-          </a:lnRef>
-          <a:fillRef idx="1">
-            <a:schemeClr val="lt1"/>
-          </a:fillRef>
-          <a:effectRef idx="0">
-            <a:schemeClr val="accent6"/>
-          </a:effectRef>
-          <a:fontRef idx="minor">
-            <a:schemeClr val="dk1"/>
-          </a:fontRef>
-        </p:style>
-        <p:txBody>
-          <a:bodyPr rtlCol="0" anchor="ctr"/>
-          <a:lstStyle/>
-          <a:p>
-            <a:pPr algn="ctr"/>
-            <a:r>
-              <a:rPr lang="es-ES" sz="900" dirty="0">
-                <a:solidFill>
-                  <a:schemeClr val="tx1"/>
-                </a:solidFill>
-                <a:latin typeface="Arial" panose="020B0604020202020204" pitchFamily="34" charset="0"/>
-                <a:cs typeface="Arial" panose="020B0604020202020204" pitchFamily="34" charset="0"/>
-              </a:rPr>
-              <a:t>sobre el eje </a:t>
-            </a:r>
-            <a:r>
-              <a:rPr lang="es-ES" sz="900" i="1" dirty="0">
-                <a:solidFill>
-                  <a:schemeClr val="tx1"/>
-                </a:solidFill>
-                <a:latin typeface="Arial" panose="020B0604020202020204" pitchFamily="34" charset="0"/>
-                <a:cs typeface="Arial" panose="020B0604020202020204" pitchFamily="34" charset="0"/>
-              </a:rPr>
-              <a:t>X</a:t>
-            </a:r>
-            <a:r>
-              <a:rPr lang="es-ES" sz="900" dirty="0">
-                <a:solidFill>
-                  <a:schemeClr val="tx1"/>
-                </a:solidFill>
-                <a:latin typeface="Arial" panose="020B0604020202020204" pitchFamily="34" charset="0"/>
-                <a:cs typeface="Arial" panose="020B0604020202020204" pitchFamily="34" charset="0"/>
-              </a:rPr>
-              <a:t> o de abscisas</a:t>
-            </a:r>
-          </a:p>
-        </p:txBody>
-      </p:sp>
-      <p:sp>
-        <p:nvSpPr>
-          <p:cNvPr id="75" name="CuadroTexto 74" descr="Conector entre nodos" title="conector"/>
-          <p:cNvSpPr txBox="1"/>
-          <p:nvPr/>
-        </p:nvSpPr>
-        <p:spPr>
-          <a:xfrm>
-            <a:off x="374590" y="3732177"/>
-            <a:ext cx="1117174" cy="230832"/>
-          </a:xfrm>
-          <a:prstGeom prst="rect">
-            <a:avLst/>
-          </a:prstGeom>
-          <a:noFill/>
-        </p:spPr>
-        <p:txBody>
-          <a:bodyPr wrap="square" rtlCol="0">
-            <a:spAutoFit/>
-          </a:bodyPr>
-          <a:lstStyle/>
-          <a:p>
-            <a:pPr algn="ctr"/>
-            <a:r>
-              <a:rPr lang="es-ES" sz="900" dirty="0">
-                <a:latin typeface="Arial" panose="020B0604020202020204" pitchFamily="34" charset="0"/>
-                <a:cs typeface="Arial" panose="020B0604020202020204" pitchFamily="34" charset="0"/>
-              </a:rPr>
-              <a:t>se representa</a:t>
-            </a:r>
-          </a:p>
-        </p:txBody>
-      </p:sp>
-      <p:cxnSp>
-        <p:nvCxnSpPr>
-          <p:cNvPr id="82" name="Conector angular 81"/>
-          <p:cNvCxnSpPr/>
-          <p:nvPr/>
-        </p:nvCxnSpPr>
-        <p:spPr>
-          <a:xfrm rot="16200000" flipH="1">
-            <a:off x="852128" y="4061428"/>
-            <a:ext cx="212150" cy="1732"/>
-          </a:xfrm>
-          <a:prstGeom prst="bentConnector3">
-            <a:avLst>
-              <a:gd name="adj1" fmla="val 95187"/>
-            </a:avLst>
-          </a:prstGeom>
-          <a:ln w="12700">
-            <a:solidFill>
-              <a:schemeClr val="tx1"/>
-            </a:solidFill>
-          </a:ln>
-        </p:spPr>
-        <p:style>
-          <a:lnRef idx="1">
-            <a:schemeClr val="accent1"/>
-          </a:lnRef>
-          <a:fillRef idx="0">
-            <a:schemeClr val="accent1"/>
-          </a:fillRef>
-          <a:effectRef idx="0">
-            <a:schemeClr val="accent1"/>
-          </a:effectRef>
-          <a:fontRef idx="minor">
-            <a:schemeClr val="tx1"/>
-          </a:fontRef>
-        </p:style>
-      </p:cxnSp>
-      <p:sp>
-        <p:nvSpPr>
-          <p:cNvPr id="130" name="CuadroTexto 129" descr="Conector entre nodos" title="conector"/>
-          <p:cNvSpPr txBox="1"/>
-          <p:nvPr/>
-        </p:nvSpPr>
-        <p:spPr>
-          <a:xfrm>
-            <a:off x="1968224" y="597921"/>
-            <a:ext cx="432746" cy="230832"/>
-          </a:xfrm>
-          <a:prstGeom prst="rect">
-            <a:avLst/>
-          </a:prstGeom>
-          <a:noFill/>
-        </p:spPr>
-        <p:txBody>
-          <a:bodyPr wrap="square" rtlCol="0">
-            <a:spAutoFit/>
-          </a:bodyPr>
-          <a:lstStyle/>
-          <a:p>
-            <a:pPr algn="ctr"/>
-            <a:r>
-              <a:rPr lang="es-ES" sz="900" dirty="0">
-                <a:latin typeface="Arial" panose="020B0604020202020204" pitchFamily="34" charset="0"/>
-                <a:cs typeface="Arial" panose="020B0604020202020204" pitchFamily="34" charset="0"/>
-              </a:rPr>
               <a:t>son</a:t>
-            </a:r>
-          </a:p>
-        </p:txBody>
-      </p:sp>
-      <p:sp>
-        <p:nvSpPr>
-          <p:cNvPr id="218" name="CuadroTexto 217" descr="Conector entre nodos" title="conector"/>
-          <p:cNvSpPr txBox="1"/>
-          <p:nvPr/>
-        </p:nvSpPr>
-        <p:spPr>
-          <a:xfrm>
-            <a:off x="2883356" y="2109603"/>
-            <a:ext cx="748168" cy="230832"/>
-          </a:xfrm>
-          <a:prstGeom prst="rect">
-            <a:avLst/>
-          </a:prstGeom>
-          <a:noFill/>
-        </p:spPr>
-        <p:txBody>
-          <a:bodyPr wrap="square" rtlCol="0">
-            <a:spAutoFit/>
-          </a:bodyPr>
-          <a:lstStyle/>
-          <a:p>
-            <a:pPr algn="ctr"/>
-            <a:r>
-              <a:rPr lang="es-ES" sz="900" dirty="0">
-                <a:latin typeface="Arial" panose="020B0604020202020204" pitchFamily="34" charset="0"/>
-                <a:cs typeface="Arial" panose="020B0604020202020204" pitchFamily="34" charset="0"/>
-              </a:rPr>
-              <a:t>se pueden</a:t>
             </a:r>
           </a:p>
         </p:txBody>
@@ -1521,7 +1128,7 @@
         </p:nvSpPr>
         <p:spPr>
           <a:xfrm>
-            <a:off x="3646976" y="4125344"/>
+            <a:off x="2814376" y="4075385"/>
             <a:ext cx="652586" cy="283083"/>
           </a:xfrm>
           <a:prstGeom prst="rect">
@@ -1585,7 +1192,7 @@
         </p:nvSpPr>
         <p:spPr>
           <a:xfrm>
-            <a:off x="3702767" y="4515615"/>
+            <a:off x="2814630" y="4443533"/>
             <a:ext cx="558588" cy="230832"/>
           </a:xfrm>
           <a:prstGeom prst="rect">
@@ -1618,7 +1225,7 @@
         </p:nvSpPr>
         <p:spPr>
           <a:xfrm>
-            <a:off x="3462630" y="4921745"/>
+            <a:off x="2484070" y="4850564"/>
             <a:ext cx="1016558" cy="1010983"/>
           </a:xfrm>
           <a:prstGeom prst="rect">
@@ -1675,12 +1282,12 @@
         </p:nvCxnSpPr>
         <p:spPr>
           <a:xfrm>
-            <a:off x="4703848" y="521955"/>
-            <a:ext cx="2405108" cy="125496"/>
+            <a:off x="4878740" y="546831"/>
+            <a:ext cx="2204485" cy="153185"/>
           </a:xfrm>
           <a:prstGeom prst="bentConnector3">
             <a:avLst>
-              <a:gd name="adj1" fmla="val 100135"/>
+              <a:gd name="adj1" fmla="val 99684"/>
             </a:avLst>
           </a:prstGeom>
           <a:ln w="12700">
@@ -1712,7 +1319,7 @@
         </p:nvSpPr>
         <p:spPr>
           <a:xfrm>
-            <a:off x="6565272" y="619286"/>
+            <a:off x="6583902" y="656269"/>
             <a:ext cx="1122431" cy="230832"/>
           </a:xfrm>
           <a:prstGeom prst="rect">
@@ -1733,513 +1340,6 @@
                 <a:cs typeface="Arial" panose="020B0604020202020204" pitchFamily="34" charset="0"/>
               </a:rPr>
               <a:t>pueden ser</a:t>
-            </a:r>
-          </a:p>
-        </p:txBody>
-      </p:sp>
-      <p:sp>
-        <p:nvSpPr>
-          <p:cNvPr id="119" name="Rectángulo 118" descr="Nodo de segundo nivel" title="Nodo02"/>
-          <p:cNvSpPr/>
-          <p:nvPr/>
-        </p:nvSpPr>
-        <p:spPr>
-          <a:xfrm>
-            <a:off x="1475907" y="2558597"/>
-            <a:ext cx="866356" cy="338295"/>
-          </a:xfrm>
-          <a:prstGeom prst="rect">
-            <a:avLst/>
-          </a:prstGeom>
-          <a:solidFill>
-            <a:schemeClr val="bg2">
-              <a:lumMod val="50000"/>
-            </a:schemeClr>
-          </a:solidFill>
-          <a:ln>
-            <a:solidFill>
-              <a:schemeClr val="tx1"/>
-            </a:solidFill>
-          </a:ln>
-        </p:spPr>
-        <p:style>
-          <a:lnRef idx="2">
-            <a:schemeClr val="accent6"/>
-          </a:lnRef>
-          <a:fillRef idx="1">
-            <a:schemeClr val="lt1"/>
-          </a:fillRef>
-          <a:effectRef idx="0">
-            <a:schemeClr val="accent6"/>
-          </a:effectRef>
-          <a:fontRef idx="minor">
-            <a:schemeClr val="dk1"/>
-          </a:fontRef>
-        </p:style>
-        <p:txBody>
-          <a:bodyPr rtlCol="0" anchor="ctr"/>
-          <a:lstStyle/>
-          <a:p>
-            <a:pPr algn="ctr"/>
-            <a:r>
-              <a:rPr lang="es-ES" sz="900" dirty="0">
-                <a:solidFill>
-                  <a:schemeClr val="bg1"/>
-                </a:solidFill>
-                <a:latin typeface="Arial" panose="020B0604020202020204" pitchFamily="34" charset="0"/>
-                <a:cs typeface="Arial" panose="020B0604020202020204" pitchFamily="34" charset="0"/>
-              </a:rPr>
-              <a:t>variable dependiente</a:t>
-            </a:r>
-          </a:p>
-        </p:txBody>
-      </p:sp>
-      <p:sp>
-        <p:nvSpPr>
-          <p:cNvPr id="121" name="CuadroTexto 120" descr="Conector entre nodos" title="conector"/>
-          <p:cNvSpPr txBox="1"/>
-          <p:nvPr/>
-        </p:nvSpPr>
-        <p:spPr>
-          <a:xfrm>
-            <a:off x="1524688" y="3005183"/>
-            <a:ext cx="938144" cy="230832"/>
-          </a:xfrm>
-          <a:prstGeom prst="rect">
-            <a:avLst/>
-          </a:prstGeom>
-          <a:noFill/>
-        </p:spPr>
-        <p:txBody>
-          <a:bodyPr wrap="square" rtlCol="0">
-            <a:spAutoFit/>
-          </a:bodyPr>
-          <a:lstStyle/>
-          <a:p>
-            <a:pPr algn="ctr"/>
-            <a:r>
-              <a:rPr lang="es-ES" sz="900" dirty="0">
-                <a:latin typeface="Arial" panose="020B0604020202020204" pitchFamily="34" charset="0"/>
-                <a:cs typeface="Arial" panose="020B0604020202020204" pitchFamily="34" charset="0"/>
-              </a:rPr>
-              <a:t>es aquella que</a:t>
-            </a:r>
-          </a:p>
-        </p:txBody>
-      </p:sp>
-      <p:sp>
-        <p:nvSpPr>
-          <p:cNvPr id="123" name="Rectángulo 122" descr="Nodo de tercer nivel" title="Nodo03"/>
-          <p:cNvSpPr/>
-          <p:nvPr/>
-        </p:nvSpPr>
-        <p:spPr>
-          <a:xfrm>
-            <a:off x="1482845" y="3325968"/>
-            <a:ext cx="1118926" cy="607194"/>
-          </a:xfrm>
-          <a:prstGeom prst="rect">
-            <a:avLst/>
-          </a:prstGeom>
-          <a:solidFill>
-            <a:schemeClr val="bg2">
-              <a:lumMod val="90000"/>
-            </a:schemeClr>
-          </a:solidFill>
-          <a:ln>
-            <a:solidFill>
-              <a:schemeClr val="tx1"/>
-            </a:solidFill>
-          </a:ln>
-        </p:spPr>
-        <p:style>
-          <a:lnRef idx="2">
-            <a:schemeClr val="accent6"/>
-          </a:lnRef>
-          <a:fillRef idx="1">
-            <a:schemeClr val="lt1"/>
-          </a:fillRef>
-          <a:effectRef idx="0">
-            <a:schemeClr val="accent6"/>
-          </a:effectRef>
-          <a:fontRef idx="minor">
-            <a:schemeClr val="dk1"/>
-          </a:fontRef>
-        </p:style>
-        <p:txBody>
-          <a:bodyPr rtlCol="0" anchor="ctr"/>
-          <a:lstStyle/>
-          <a:p>
-            <a:pPr algn="ctr"/>
-            <a:r>
-              <a:rPr lang="es-ES" sz="900" dirty="0">
-                <a:solidFill>
-                  <a:schemeClr val="tx1"/>
-                </a:solidFill>
-                <a:latin typeface="Arial" panose="020B0604020202020204" pitchFamily="34" charset="0"/>
-                <a:cs typeface="Arial" panose="020B0604020202020204" pitchFamily="34" charset="0"/>
-              </a:rPr>
-              <a:t>depende de los valores que tome la variable independiente</a:t>
-            </a:r>
-          </a:p>
-        </p:txBody>
-      </p:sp>
-      <p:cxnSp>
-        <p:nvCxnSpPr>
-          <p:cNvPr id="124" name="Conector angular 123"/>
-          <p:cNvCxnSpPr/>
-          <p:nvPr/>
-        </p:nvCxnSpPr>
-        <p:spPr>
-          <a:xfrm rot="5400000">
-            <a:off x="1868331" y="3258695"/>
-            <a:ext cx="143029" cy="875"/>
-          </a:xfrm>
-          <a:prstGeom prst="bentConnector3">
-            <a:avLst>
-              <a:gd name="adj1" fmla="val 50000"/>
-            </a:avLst>
-          </a:prstGeom>
-          <a:ln w="12700">
-            <a:solidFill>
-              <a:schemeClr val="tx1"/>
-            </a:solidFill>
-          </a:ln>
-        </p:spPr>
-        <p:style>
-          <a:lnRef idx="1">
-            <a:schemeClr val="accent1"/>
-          </a:lnRef>
-          <a:fillRef idx="0">
-            <a:schemeClr val="accent1"/>
-          </a:fillRef>
-          <a:effectRef idx="0">
-            <a:schemeClr val="accent1"/>
-          </a:effectRef>
-          <a:fontRef idx="minor">
-            <a:schemeClr val="tx1"/>
-          </a:fontRef>
-        </p:style>
-      </p:cxnSp>
-      <p:cxnSp>
-        <p:nvCxnSpPr>
-          <p:cNvPr id="125" name="Conector angular 124"/>
-          <p:cNvCxnSpPr/>
-          <p:nvPr/>
-        </p:nvCxnSpPr>
-        <p:spPr>
-          <a:xfrm rot="5400000" flipH="1" flipV="1">
-            <a:off x="1883865" y="3997334"/>
-            <a:ext cx="127078" cy="876"/>
-          </a:xfrm>
-          <a:prstGeom prst="bentConnector3">
-            <a:avLst>
-              <a:gd name="adj1" fmla="val 20309"/>
-            </a:avLst>
-          </a:prstGeom>
-          <a:ln w="12700">
-            <a:solidFill>
-              <a:schemeClr val="tx1"/>
-            </a:solidFill>
-          </a:ln>
-        </p:spPr>
-        <p:style>
-          <a:lnRef idx="1">
-            <a:schemeClr val="accent1"/>
-          </a:lnRef>
-          <a:fillRef idx="0">
-            <a:schemeClr val="accent1"/>
-          </a:fillRef>
-          <a:effectRef idx="0">
-            <a:schemeClr val="accent1"/>
-          </a:effectRef>
-          <a:fontRef idx="minor">
-            <a:schemeClr val="tx1"/>
-          </a:fontRef>
-        </p:style>
-      </p:cxnSp>
-      <p:sp>
-        <p:nvSpPr>
-          <p:cNvPr id="131" name="Rectángulo 130" descr="Nodo de cuarto nivel&#10;" title="Nodo04"/>
-          <p:cNvSpPr/>
-          <p:nvPr/>
-        </p:nvSpPr>
-        <p:spPr>
-          <a:xfrm>
-            <a:off x="1501620" y="4403079"/>
-            <a:ext cx="1000403" cy="353519"/>
-          </a:xfrm>
-          <a:prstGeom prst="rect">
-            <a:avLst/>
-          </a:prstGeom>
-          <a:solidFill>
-            <a:schemeClr val="bg1"/>
-          </a:solidFill>
-          <a:ln>
-            <a:solidFill>
-              <a:schemeClr val="tx1"/>
-            </a:solidFill>
-          </a:ln>
-        </p:spPr>
-        <p:style>
-          <a:lnRef idx="2">
-            <a:schemeClr val="accent6"/>
-          </a:lnRef>
-          <a:fillRef idx="1">
-            <a:schemeClr val="lt1"/>
-          </a:fillRef>
-          <a:effectRef idx="0">
-            <a:schemeClr val="accent6"/>
-          </a:effectRef>
-          <a:fontRef idx="minor">
-            <a:schemeClr val="dk1"/>
-          </a:fontRef>
-        </p:style>
-        <p:txBody>
-          <a:bodyPr rtlCol="0" anchor="ctr"/>
-          <a:lstStyle/>
-          <a:p>
-            <a:pPr algn="ctr"/>
-            <a:r>
-              <a:rPr lang="es-ES" sz="900" dirty="0">
-                <a:solidFill>
-                  <a:schemeClr val="tx1"/>
-                </a:solidFill>
-                <a:latin typeface="Arial" panose="020B0604020202020204" pitchFamily="34" charset="0"/>
-                <a:cs typeface="Arial" panose="020B0604020202020204" pitchFamily="34" charset="0"/>
-              </a:rPr>
-              <a:t>sobre el eje </a:t>
-            </a:r>
-            <a:r>
-              <a:rPr lang="es-ES" sz="900" i="1" dirty="0">
-                <a:solidFill>
-                  <a:schemeClr val="tx1"/>
-                </a:solidFill>
-                <a:latin typeface="Arial" panose="020B0604020202020204" pitchFamily="34" charset="0"/>
-                <a:cs typeface="Arial" panose="020B0604020202020204" pitchFamily="34" charset="0"/>
-              </a:rPr>
-              <a:t>Y o</a:t>
-            </a:r>
-            <a:r>
-              <a:rPr lang="es-ES" sz="900" dirty="0">
-                <a:solidFill>
-                  <a:schemeClr val="tx1"/>
-                </a:solidFill>
-                <a:latin typeface="Arial" panose="020B0604020202020204" pitchFamily="34" charset="0"/>
-                <a:cs typeface="Arial" panose="020B0604020202020204" pitchFamily="34" charset="0"/>
-              </a:rPr>
-              <a:t> de ordenadas</a:t>
-            </a:r>
-          </a:p>
-        </p:txBody>
-      </p:sp>
-      <p:sp>
-        <p:nvSpPr>
-          <p:cNvPr id="135" name="CuadroTexto 134" descr="Conector entre nodos" title="conector"/>
-          <p:cNvSpPr txBox="1"/>
-          <p:nvPr/>
-        </p:nvSpPr>
-        <p:spPr>
-          <a:xfrm>
-            <a:off x="1537901" y="4037207"/>
-            <a:ext cx="916998" cy="230832"/>
-          </a:xfrm>
-          <a:prstGeom prst="rect">
-            <a:avLst/>
-          </a:prstGeom>
-          <a:noFill/>
-        </p:spPr>
-        <p:txBody>
-          <a:bodyPr wrap="square" rtlCol="0">
-            <a:spAutoFit/>
-          </a:bodyPr>
-          <a:lstStyle/>
-          <a:p>
-            <a:pPr algn="ctr"/>
-            <a:r>
-              <a:rPr lang="es-ES" sz="900" dirty="0">
-                <a:latin typeface="Arial" panose="020B0604020202020204" pitchFamily="34" charset="0"/>
-                <a:cs typeface="Arial" panose="020B0604020202020204" pitchFamily="34" charset="0"/>
-              </a:rPr>
-              <a:t>se representa</a:t>
-            </a:r>
-          </a:p>
-        </p:txBody>
-      </p:sp>
-      <p:cxnSp>
-        <p:nvCxnSpPr>
-          <p:cNvPr id="136" name="Conector angular 135"/>
-          <p:cNvCxnSpPr/>
-          <p:nvPr/>
-        </p:nvCxnSpPr>
-        <p:spPr>
-          <a:xfrm rot="5400000">
-            <a:off x="1865981" y="4326205"/>
-            <a:ext cx="150138" cy="3285"/>
-          </a:xfrm>
-          <a:prstGeom prst="bentConnector3">
-            <a:avLst>
-              <a:gd name="adj1" fmla="val 884"/>
-            </a:avLst>
-          </a:prstGeom>
-          <a:ln w="12700">
-            <a:solidFill>
-              <a:schemeClr val="tx1"/>
-            </a:solidFill>
-          </a:ln>
-        </p:spPr>
-        <p:style>
-          <a:lnRef idx="1">
-            <a:schemeClr val="accent1"/>
-          </a:lnRef>
-          <a:fillRef idx="0">
-            <a:schemeClr val="accent1"/>
-          </a:fillRef>
-          <a:effectRef idx="0">
-            <a:schemeClr val="accent1"/>
-          </a:effectRef>
-          <a:fontRef idx="minor">
-            <a:schemeClr val="tx1"/>
-          </a:fontRef>
-        </p:style>
-      </p:cxnSp>
-      <p:cxnSp>
-        <p:nvCxnSpPr>
-          <p:cNvPr id="149" name="Conector angular 148"/>
-          <p:cNvCxnSpPr/>
-          <p:nvPr/>
-        </p:nvCxnSpPr>
-        <p:spPr>
-          <a:xfrm rot="5400000">
-            <a:off x="1989834" y="961374"/>
-            <a:ext cx="290744" cy="5652"/>
-          </a:xfrm>
-          <a:prstGeom prst="bentConnector3">
-            <a:avLst>
-              <a:gd name="adj1" fmla="val 101841"/>
-            </a:avLst>
-          </a:prstGeom>
-          <a:ln w="12700">
-            <a:solidFill>
-              <a:schemeClr val="tx1"/>
-            </a:solidFill>
-          </a:ln>
-        </p:spPr>
-        <p:style>
-          <a:lnRef idx="1">
-            <a:schemeClr val="accent1"/>
-          </a:lnRef>
-          <a:fillRef idx="0">
-            <a:schemeClr val="accent1"/>
-          </a:fillRef>
-          <a:effectRef idx="0">
-            <a:schemeClr val="accent1"/>
-          </a:effectRef>
-          <a:fontRef idx="minor">
-            <a:schemeClr val="tx1"/>
-          </a:fontRef>
-        </p:style>
-      </p:cxnSp>
-      <p:sp>
-        <p:nvSpPr>
-          <p:cNvPr id="160" name="Rectángulo 159" descr="Nodo de segundo nivel" title="Nodo02"/>
-          <p:cNvSpPr/>
-          <p:nvPr/>
-        </p:nvSpPr>
-        <p:spPr>
-          <a:xfrm>
-            <a:off x="2752306" y="2555256"/>
-            <a:ext cx="1010558" cy="678493"/>
-          </a:xfrm>
-          <a:prstGeom prst="rect">
-            <a:avLst/>
-          </a:prstGeom>
-          <a:solidFill>
-            <a:schemeClr val="bg2">
-              <a:lumMod val="50000"/>
-            </a:schemeClr>
-          </a:solidFill>
-          <a:ln>
-            <a:solidFill>
-              <a:schemeClr val="tx1"/>
-            </a:solidFill>
-          </a:ln>
-        </p:spPr>
-        <p:style>
-          <a:lnRef idx="2">
-            <a:schemeClr val="accent6"/>
-          </a:lnRef>
-          <a:fillRef idx="1">
-            <a:schemeClr val="lt1"/>
-          </a:fillRef>
-          <a:effectRef idx="0">
-            <a:schemeClr val="accent6"/>
-          </a:effectRef>
-          <a:fontRef idx="minor">
-            <a:schemeClr val="dk1"/>
-          </a:fontRef>
-        </p:style>
-        <p:txBody>
-          <a:bodyPr rtlCol="0" anchor="ctr"/>
-          <a:lstStyle/>
-          <a:p>
-            <a:r>
-              <a:rPr lang="es-ES" sz="900" dirty="0">
-                <a:solidFill>
-                  <a:schemeClr val="bg1"/>
-                </a:solidFill>
-                <a:latin typeface="Arial" panose="020B0604020202020204" pitchFamily="34" charset="0"/>
-                <a:cs typeface="Arial" panose="020B0604020202020204" pitchFamily="34" charset="0"/>
-              </a:rPr>
-              <a:t>representar en</a:t>
-            </a:r>
-          </a:p>
-          <a:p>
-            <a:pPr marL="171450" indent="-171450">
-              <a:buFont typeface="Arial" panose="020B0604020202020204" pitchFamily="34" charset="0"/>
-              <a:buChar char="•"/>
-            </a:pPr>
-            <a:r>
-              <a:rPr lang="es-ES" sz="900" dirty="0">
-                <a:solidFill>
-                  <a:schemeClr val="bg1"/>
-                </a:solidFill>
-                <a:latin typeface="Arial" panose="020B0604020202020204" pitchFamily="34" charset="0"/>
-                <a:cs typeface="Arial" panose="020B0604020202020204" pitchFamily="34" charset="0"/>
-              </a:rPr>
-              <a:t>gráficas</a:t>
-            </a:r>
-          </a:p>
-          <a:p>
-            <a:pPr marL="171450" indent="-171450">
-              <a:buFont typeface="Arial" panose="020B0604020202020204" pitchFamily="34" charset="0"/>
-              <a:buChar char="•"/>
-            </a:pPr>
-            <a:r>
-              <a:rPr lang="es-ES" sz="900" dirty="0">
-                <a:solidFill>
-                  <a:schemeClr val="bg1"/>
-                </a:solidFill>
-                <a:latin typeface="Arial" panose="020B0604020202020204" pitchFamily="34" charset="0"/>
-                <a:cs typeface="Arial" panose="020B0604020202020204" pitchFamily="34" charset="0"/>
-              </a:rPr>
-              <a:t>tablas</a:t>
-            </a:r>
-          </a:p>
-          <a:p>
-            <a:pPr marL="171450" indent="-171450">
-              <a:buFont typeface="Arial" panose="020B0604020202020204" pitchFamily="34" charset="0"/>
-              <a:buChar char="•"/>
-            </a:pPr>
-            <a:r>
-              <a:rPr lang="es-ES" sz="900" dirty="0">
-                <a:solidFill>
-                  <a:schemeClr val="bg1"/>
-                </a:solidFill>
-                <a:latin typeface="Arial" panose="020B0604020202020204" pitchFamily="34" charset="0"/>
-                <a:cs typeface="Arial" panose="020B0604020202020204" pitchFamily="34" charset="0"/>
-              </a:rPr>
-              <a:t>fórmulas</a:t>
             </a:r>
           </a:p>
         </p:txBody>
@@ -2252,7 +1352,7 @@
         </p:nvSpPr>
         <p:spPr>
           <a:xfrm>
-            <a:off x="3453653" y="1113147"/>
+            <a:off x="3182014" y="1199835"/>
             <a:ext cx="1070890" cy="266075"/>
           </a:xfrm>
           <a:prstGeom prst="rect">
@@ -2311,7 +1411,7 @@
         </p:nvSpPr>
         <p:spPr>
           <a:xfrm>
-            <a:off x="3645602" y="612921"/>
+            <a:off x="3370044" y="691946"/>
             <a:ext cx="686992" cy="230832"/>
           </a:xfrm>
           <a:prstGeom prst="rect">
@@ -2344,7 +1444,7 @@
         </p:nvSpPr>
         <p:spPr>
           <a:xfrm>
-            <a:off x="4605763" y="4119858"/>
+            <a:off x="3580110" y="4074642"/>
             <a:ext cx="904498" cy="283826"/>
           </a:xfrm>
           <a:prstGeom prst="rect">
@@ -2408,7 +1508,7 @@
         </p:nvSpPr>
         <p:spPr>
           <a:xfrm>
-            <a:off x="5800690" y="4119858"/>
+            <a:off x="4675423" y="4085495"/>
             <a:ext cx="741138" cy="269965"/>
           </a:xfrm>
           <a:prstGeom prst="rect">
@@ -2472,8 +1572,8 @@
         </p:nvSpPr>
         <p:spPr>
           <a:xfrm>
-            <a:off x="3421532" y="1517266"/>
-            <a:ext cx="1122431" cy="215444"/>
+            <a:off x="3331794" y="1641758"/>
+            <a:ext cx="771610" cy="215444"/>
           </a:xfrm>
           <a:prstGeom prst="rect">
             <a:avLst/>
@@ -2493,388 +1593,6 @@
                 <a:cs typeface="Arial" panose="020B0604020202020204" pitchFamily="34" charset="0"/>
               </a:rPr>
               <a:t>tales como</a:t>
-            </a:r>
-          </a:p>
-        </p:txBody>
-      </p:sp>
-      <p:sp>
-        <p:nvSpPr>
-          <p:cNvPr id="87" name="Rectángulo 86" descr="Nodo de cuarto nivel&#10;" title="Nodo04"/>
-          <p:cNvSpPr/>
-          <p:nvPr/>
-        </p:nvSpPr>
-        <p:spPr>
-          <a:xfrm>
-            <a:off x="463527" y="5015397"/>
-            <a:ext cx="857719" cy="368687"/>
-          </a:xfrm>
-          <a:prstGeom prst="rect">
-            <a:avLst/>
-          </a:prstGeom>
-          <a:solidFill>
-            <a:schemeClr val="bg1"/>
-          </a:solidFill>
-          <a:ln>
-            <a:solidFill>
-              <a:schemeClr val="tx1"/>
-            </a:solidFill>
-          </a:ln>
-        </p:spPr>
-        <p:style>
-          <a:lnRef idx="2">
-            <a:schemeClr val="accent6"/>
-          </a:lnRef>
-          <a:fillRef idx="1">
-            <a:schemeClr val="lt1"/>
-          </a:fillRef>
-          <a:effectRef idx="0">
-            <a:schemeClr val="accent6"/>
-          </a:effectRef>
-          <a:fontRef idx="minor">
-            <a:schemeClr val="dk1"/>
-          </a:fontRef>
-        </p:style>
-        <p:txBody>
-          <a:bodyPr rtlCol="0" anchor="ctr"/>
-          <a:lstStyle/>
-          <a:p>
-            <a:pPr algn="ctr"/>
-            <a:r>
-              <a:rPr lang="es-ES" sz="900" dirty="0">
-                <a:solidFill>
-                  <a:schemeClr val="tx1"/>
-                </a:solidFill>
-                <a:latin typeface="Arial" panose="020B0604020202020204" pitchFamily="34" charset="0"/>
-                <a:cs typeface="Arial" panose="020B0604020202020204" pitchFamily="34" charset="0"/>
-              </a:rPr>
-              <a:t>el </a:t>
-            </a:r>
-            <a:r>
-              <a:rPr lang="es-ES" sz="900" b="1" dirty="0">
-                <a:solidFill>
-                  <a:schemeClr val="tx1"/>
-                </a:solidFill>
-                <a:latin typeface="Arial" panose="020B0604020202020204" pitchFamily="34" charset="0"/>
-                <a:cs typeface="Arial" panose="020B0604020202020204" pitchFamily="34" charset="0"/>
-              </a:rPr>
-              <a:t>dominio</a:t>
-            </a:r>
-            <a:r>
-              <a:rPr lang="es-ES" sz="900" dirty="0">
-                <a:solidFill>
-                  <a:schemeClr val="tx1"/>
-                </a:solidFill>
-                <a:latin typeface="Arial" panose="020B0604020202020204" pitchFamily="34" charset="0"/>
-                <a:cs typeface="Arial" panose="020B0604020202020204" pitchFamily="34" charset="0"/>
-              </a:rPr>
-              <a:t> de la función</a:t>
-            </a:r>
-          </a:p>
-        </p:txBody>
-      </p:sp>
-      <p:sp>
-        <p:nvSpPr>
-          <p:cNvPr id="89" name="CuadroTexto 88" descr="Conector entre nodos" title="conector"/>
-          <p:cNvSpPr txBox="1"/>
-          <p:nvPr/>
-        </p:nvSpPr>
-        <p:spPr>
-          <a:xfrm>
-            <a:off x="610969" y="4627193"/>
-            <a:ext cx="633154" cy="230832"/>
-          </a:xfrm>
-          <a:prstGeom prst="rect">
-            <a:avLst/>
-          </a:prstGeom>
-          <a:noFill/>
-        </p:spPr>
-        <p:txBody>
-          <a:bodyPr wrap="square" rtlCol="0">
-            <a:spAutoFit/>
-          </a:bodyPr>
-          <a:lstStyle/>
-          <a:p>
-            <a:pPr algn="ctr"/>
-            <a:r>
-              <a:rPr lang="es-ES" sz="900" dirty="0">
-                <a:latin typeface="Arial" panose="020B0604020202020204" pitchFamily="34" charset="0"/>
-                <a:cs typeface="Arial" panose="020B0604020202020204" pitchFamily="34" charset="0"/>
-              </a:rPr>
-              <a:t>definen</a:t>
-            </a:r>
-          </a:p>
-        </p:txBody>
-      </p:sp>
-      <p:sp>
-        <p:nvSpPr>
-          <p:cNvPr id="90" name="CuadroTexto 89" descr="Conector entre nodos" title="conector"/>
-          <p:cNvSpPr txBox="1"/>
-          <p:nvPr/>
-        </p:nvSpPr>
-        <p:spPr>
-          <a:xfrm>
-            <a:off x="1507901" y="4853186"/>
-            <a:ext cx="878129" cy="230832"/>
-          </a:xfrm>
-          <a:prstGeom prst="rect">
-            <a:avLst/>
-          </a:prstGeom>
-          <a:noFill/>
-        </p:spPr>
-        <p:txBody>
-          <a:bodyPr wrap="square" rtlCol="0">
-            <a:spAutoFit/>
-          </a:bodyPr>
-          <a:lstStyle/>
-          <a:p>
-            <a:pPr algn="ctr"/>
-            <a:r>
-              <a:rPr lang="es-ES" sz="900" dirty="0">
-                <a:latin typeface="Arial" panose="020B0604020202020204" pitchFamily="34" charset="0"/>
-                <a:cs typeface="Arial" panose="020B0604020202020204" pitchFamily="34" charset="0"/>
-              </a:rPr>
-              <a:t>conforman</a:t>
-            </a:r>
-          </a:p>
-        </p:txBody>
-      </p:sp>
-      <p:sp>
-        <p:nvSpPr>
-          <p:cNvPr id="91" name="Rectángulo 90" descr="Nodo de cuarto nivel&#10;" title="Nodo04"/>
-          <p:cNvSpPr/>
-          <p:nvPr/>
-        </p:nvSpPr>
-        <p:spPr>
-          <a:xfrm>
-            <a:off x="1581996" y="5233800"/>
-            <a:ext cx="760614" cy="353519"/>
-          </a:xfrm>
-          <a:prstGeom prst="rect">
-            <a:avLst/>
-          </a:prstGeom>
-          <a:solidFill>
-            <a:schemeClr val="bg1"/>
-          </a:solidFill>
-          <a:ln>
-            <a:solidFill>
-              <a:schemeClr val="tx1"/>
-            </a:solidFill>
-          </a:ln>
-        </p:spPr>
-        <p:style>
-          <a:lnRef idx="2">
-            <a:schemeClr val="accent6"/>
-          </a:lnRef>
-          <a:fillRef idx="1">
-            <a:schemeClr val="lt1"/>
-          </a:fillRef>
-          <a:effectRef idx="0">
-            <a:schemeClr val="accent6"/>
-          </a:effectRef>
-          <a:fontRef idx="minor">
-            <a:schemeClr val="dk1"/>
-          </a:fontRef>
-        </p:style>
-        <p:txBody>
-          <a:bodyPr rtlCol="0" anchor="ctr"/>
-          <a:lstStyle/>
-          <a:p>
-            <a:pPr algn="ctr"/>
-            <a:r>
-              <a:rPr lang="es-ES" sz="900" dirty="0">
-                <a:solidFill>
-                  <a:schemeClr val="tx1"/>
-                </a:solidFill>
-                <a:latin typeface="Arial" panose="020B0604020202020204" pitchFamily="34" charset="0"/>
-                <a:cs typeface="Arial" panose="020B0604020202020204" pitchFamily="34" charset="0"/>
-              </a:rPr>
-              <a:t>el recorrido o </a:t>
-            </a:r>
-            <a:r>
-              <a:rPr lang="es-ES" sz="900" b="1" dirty="0">
-                <a:solidFill>
-                  <a:schemeClr val="tx1"/>
-                </a:solidFill>
-                <a:latin typeface="Arial" panose="020B0604020202020204" pitchFamily="34" charset="0"/>
-                <a:cs typeface="Arial" panose="020B0604020202020204" pitchFamily="34" charset="0"/>
-              </a:rPr>
-              <a:t>rango</a:t>
-            </a:r>
-          </a:p>
-        </p:txBody>
-      </p:sp>
-      <p:sp>
-        <p:nvSpPr>
-          <p:cNvPr id="92" name="Rectángulo 91" descr="Nodo de cuarto nivel&#10;" title="Nodo04"/>
-          <p:cNvSpPr/>
-          <p:nvPr/>
-        </p:nvSpPr>
-        <p:spPr>
-          <a:xfrm>
-            <a:off x="420246" y="5959346"/>
-            <a:ext cx="960411" cy="690969"/>
-          </a:xfrm>
-          <a:prstGeom prst="rect">
-            <a:avLst/>
-          </a:prstGeom>
-          <a:solidFill>
-            <a:schemeClr val="bg1"/>
-          </a:solidFill>
-          <a:ln>
-            <a:solidFill>
-              <a:schemeClr val="tx1"/>
-            </a:solidFill>
-          </a:ln>
-        </p:spPr>
-        <p:style>
-          <a:lnRef idx="2">
-            <a:schemeClr val="accent6"/>
-          </a:lnRef>
-          <a:fillRef idx="1">
-            <a:schemeClr val="lt1"/>
-          </a:fillRef>
-          <a:effectRef idx="0">
-            <a:schemeClr val="accent6"/>
-          </a:effectRef>
-          <a:fontRef idx="minor">
-            <a:schemeClr val="dk1"/>
-          </a:fontRef>
-        </p:style>
-        <p:txBody>
-          <a:bodyPr rtlCol="0" anchor="ctr"/>
-          <a:lstStyle/>
-          <a:p>
-            <a:pPr algn="ctr"/>
-            <a:r>
-              <a:rPr lang="es-ES" sz="900" dirty="0">
-                <a:solidFill>
-                  <a:schemeClr val="tx1"/>
-                </a:solidFill>
-                <a:latin typeface="Arial" panose="020B0604020202020204" pitchFamily="34" charset="0"/>
-                <a:cs typeface="Arial" panose="020B0604020202020204" pitchFamily="34" charset="0"/>
-              </a:rPr>
-              <a:t>el conjunto numérico para los cuales está definida la función</a:t>
-            </a:r>
-          </a:p>
-        </p:txBody>
-      </p:sp>
-      <p:sp>
-        <p:nvSpPr>
-          <p:cNvPr id="93" name="CuadroTexto 92" descr="Conector entre nodos" title="conector"/>
-          <p:cNvSpPr txBox="1"/>
-          <p:nvPr/>
-        </p:nvSpPr>
-        <p:spPr>
-          <a:xfrm>
-            <a:off x="610969" y="5549318"/>
-            <a:ext cx="577721" cy="230832"/>
-          </a:xfrm>
-          <a:prstGeom prst="rect">
-            <a:avLst/>
-          </a:prstGeom>
-          <a:noFill/>
-        </p:spPr>
-        <p:txBody>
-          <a:bodyPr wrap="square" rtlCol="0">
-            <a:spAutoFit/>
-          </a:bodyPr>
-          <a:lstStyle/>
-          <a:p>
-            <a:pPr algn="ctr"/>
-            <a:r>
-              <a:rPr lang="es-ES" sz="900" dirty="0">
-                <a:latin typeface="Arial" panose="020B0604020202020204" pitchFamily="34" charset="0"/>
-                <a:cs typeface="Arial" panose="020B0604020202020204" pitchFamily="34" charset="0"/>
-              </a:rPr>
-              <a:t>que es</a:t>
-            </a:r>
-          </a:p>
-        </p:txBody>
-      </p:sp>
-      <p:sp>
-        <p:nvSpPr>
-          <p:cNvPr id="94" name="CuadroTexto 93" descr="Conector entre nodos" title="conector"/>
-          <p:cNvSpPr txBox="1"/>
-          <p:nvPr/>
-        </p:nvSpPr>
-        <p:spPr>
-          <a:xfrm>
-            <a:off x="1532602" y="5665507"/>
-            <a:ext cx="730690" cy="230832"/>
-          </a:xfrm>
-          <a:prstGeom prst="rect">
-            <a:avLst/>
-          </a:prstGeom>
-          <a:noFill/>
-        </p:spPr>
-        <p:txBody>
-          <a:bodyPr wrap="square" rtlCol="0">
-            <a:spAutoFit/>
-          </a:bodyPr>
-          <a:lstStyle/>
-          <a:p>
-            <a:pPr algn="ctr"/>
-            <a:r>
-              <a:rPr lang="es-ES" sz="900" dirty="0">
-                <a:latin typeface="Arial" panose="020B0604020202020204" pitchFamily="34" charset="0"/>
-                <a:cs typeface="Arial" panose="020B0604020202020204" pitchFamily="34" charset="0"/>
-              </a:rPr>
-              <a:t>que es</a:t>
-            </a:r>
-          </a:p>
-        </p:txBody>
-      </p:sp>
-      <p:sp>
-        <p:nvSpPr>
-          <p:cNvPr id="95" name="Rectángulo 94" descr="Nodo de cuarto nivel&#10;" title="Nodo04"/>
-          <p:cNvSpPr/>
-          <p:nvPr/>
-        </p:nvSpPr>
-        <p:spPr>
-          <a:xfrm>
-            <a:off x="1459971" y="6004232"/>
-            <a:ext cx="1241859" cy="701692"/>
-          </a:xfrm>
-          <a:prstGeom prst="rect">
-            <a:avLst/>
-          </a:prstGeom>
-          <a:solidFill>
-            <a:schemeClr val="bg1"/>
-          </a:solidFill>
-          <a:ln>
-            <a:solidFill>
-              <a:schemeClr val="tx1"/>
-            </a:solidFill>
-          </a:ln>
-        </p:spPr>
-        <p:style>
-          <a:lnRef idx="2">
-            <a:schemeClr val="accent6"/>
-          </a:lnRef>
-          <a:fillRef idx="1">
-            <a:schemeClr val="lt1"/>
-          </a:fillRef>
-          <a:effectRef idx="0">
-            <a:schemeClr val="accent6"/>
-          </a:effectRef>
-          <a:fontRef idx="minor">
-            <a:schemeClr val="dk1"/>
-          </a:fontRef>
-        </p:style>
-        <p:txBody>
-          <a:bodyPr rtlCol="0" anchor="ctr"/>
-          <a:lstStyle/>
-          <a:p>
-            <a:pPr algn="ctr"/>
-            <a:r>
-              <a:rPr lang="es-ES" sz="900" dirty="0">
-                <a:solidFill>
-                  <a:schemeClr val="tx1"/>
-                </a:solidFill>
-                <a:latin typeface="Arial" panose="020B0604020202020204" pitchFamily="34" charset="0"/>
-                <a:cs typeface="Arial" panose="020B0604020202020204" pitchFamily="34" charset="0"/>
-              </a:rPr>
-              <a:t>el conjunto formado por las imágenes de los elementos del dominio a través de la función</a:t>
             </a:r>
           </a:p>
         </p:txBody>
@@ -2887,7 +1605,7 @@
         </p:nvSpPr>
         <p:spPr>
           <a:xfrm>
-            <a:off x="4543963" y="4921745"/>
+            <a:off x="3602934" y="4849238"/>
             <a:ext cx="1012628" cy="1209877"/>
           </a:xfrm>
           <a:prstGeom prst="rect">
@@ -2944,8 +1662,8 @@
         </p:nvSpPr>
         <p:spPr>
           <a:xfrm>
-            <a:off x="5630831" y="4904981"/>
-            <a:ext cx="1085743" cy="779879"/>
+            <a:off x="4663874" y="4858567"/>
+            <a:ext cx="1054109" cy="929867"/>
           </a:xfrm>
           <a:prstGeom prst="rect">
             <a:avLst/>
@@ -3040,14 +1758,12 @@
           <p:nvPr/>
         </p:nvCxnSpPr>
         <p:spPr>
-          <a:xfrm rot="16200000" flipH="1">
-            <a:off x="7716845" y="220466"/>
-            <a:ext cx="284255" cy="1500953"/>
-          </a:xfrm>
-          <a:prstGeom prst="bentConnector3">
-            <a:avLst>
-              <a:gd name="adj1" fmla="val 50000"/>
-            </a:avLst>
+          <a:xfrm>
+            <a:off x="6866117" y="1037033"/>
+            <a:ext cx="1498009" cy="318766"/>
+          </a:xfrm>
+          <a:prstGeom prst="bentConnector2">
+            <a:avLst/>
           </a:prstGeom>
           <a:ln w="12700">
             <a:solidFill>
@@ -3078,7 +1794,7 @@
         </p:nvSpPr>
         <p:spPr>
           <a:xfrm>
-            <a:off x="4729689" y="1135497"/>
+            <a:off x="4501622" y="1208157"/>
             <a:ext cx="981161" cy="256876"/>
           </a:xfrm>
           <a:prstGeom prst="rect">
@@ -3144,7 +1860,7 @@
         </p:nvSpPr>
         <p:spPr>
           <a:xfrm>
-            <a:off x="5918280" y="1143466"/>
+            <a:off x="5690213" y="1216126"/>
             <a:ext cx="1127238" cy="245838"/>
           </a:xfrm>
           <a:prstGeom prst="rect">
@@ -3203,7 +1919,7 @@
         </p:nvSpPr>
         <p:spPr>
           <a:xfrm>
-            <a:off x="7130083" y="1140476"/>
+            <a:off x="6902016" y="1213136"/>
             <a:ext cx="952566" cy="241540"/>
           </a:xfrm>
           <a:prstGeom prst="rect">
@@ -3262,8 +1978,8 @@
         </p:nvSpPr>
         <p:spPr>
           <a:xfrm>
-            <a:off x="8159618" y="1126821"/>
-            <a:ext cx="950093" cy="253730"/>
+            <a:off x="7903248" y="1214631"/>
+            <a:ext cx="949338" cy="236065"/>
           </a:xfrm>
           <a:prstGeom prst="rect">
             <a:avLst/>
@@ -3321,7 +2037,7 @@
         </p:nvSpPr>
         <p:spPr>
           <a:xfrm>
-            <a:off x="6814564" y="4101509"/>
+            <a:off x="5615838" y="4080570"/>
             <a:ext cx="1012137" cy="544605"/>
           </a:xfrm>
           <a:prstGeom prst="rect">
@@ -3378,7 +2094,7 @@
         </p:nvSpPr>
         <p:spPr>
           <a:xfrm>
-            <a:off x="4665144" y="1498624"/>
+            <a:off x="4437077" y="1571284"/>
             <a:ext cx="1117174" cy="230836"/>
           </a:xfrm>
           <a:prstGeom prst="rect">
@@ -3411,7 +2127,7 @@
         </p:nvSpPr>
         <p:spPr>
           <a:xfrm>
-            <a:off x="4618625" y="1880657"/>
+            <a:off x="4390558" y="1953317"/>
             <a:ext cx="1194264" cy="508114"/>
           </a:xfrm>
           <a:prstGeom prst="rect">
@@ -3698,7 +2414,7 @@
         </p:nvSpPr>
         <p:spPr>
           <a:xfrm>
-            <a:off x="4703848" y="2527525"/>
+            <a:off x="4475781" y="2600185"/>
             <a:ext cx="1020392" cy="230832"/>
           </a:xfrm>
           <a:prstGeom prst="rect">
@@ -3731,7 +2447,7 @@
         </p:nvSpPr>
         <p:spPr>
           <a:xfrm>
-            <a:off x="4663874" y="2927971"/>
+            <a:off x="4435807" y="3000631"/>
             <a:ext cx="1088705" cy="669904"/>
           </a:xfrm>
           <a:prstGeom prst="rect">
@@ -3849,7 +2565,7 @@
         </p:nvSpPr>
         <p:spPr>
           <a:xfrm>
-            <a:off x="6106293" y="1493524"/>
+            <a:off x="5878570" y="1580448"/>
             <a:ext cx="742629" cy="230832"/>
           </a:xfrm>
           <a:prstGeom prst="rect">
@@ -3882,7 +2598,7 @@
         </p:nvSpPr>
         <p:spPr>
           <a:xfrm>
-            <a:off x="5868414" y="1882760"/>
+            <a:off x="5640347" y="1955420"/>
             <a:ext cx="1214043" cy="522290"/>
           </a:xfrm>
           <a:prstGeom prst="rect">
@@ -3994,7 +2710,7 @@
         </p:nvSpPr>
         <p:spPr>
           <a:xfrm>
-            <a:off x="7302557" y="1498624"/>
+            <a:off x="7074490" y="1571284"/>
             <a:ext cx="605960" cy="230836"/>
           </a:xfrm>
           <a:prstGeom prst="rect">
@@ -4027,7 +2743,7 @@
         </p:nvSpPr>
         <p:spPr>
           <a:xfrm>
-            <a:off x="7128175" y="1878153"/>
+            <a:off x="6900108" y="1950813"/>
             <a:ext cx="954474" cy="1082102"/>
           </a:xfrm>
           <a:prstGeom prst="rect">
@@ -4104,7 +2820,7 @@
         </p:nvSpPr>
         <p:spPr>
           <a:xfrm>
-            <a:off x="8159618" y="1875402"/>
+            <a:off x="7931551" y="1948062"/>
             <a:ext cx="935980" cy="1297181"/>
           </a:xfrm>
           <a:prstGeom prst="rect">
@@ -4181,7 +2897,7 @@
         </p:nvSpPr>
         <p:spPr>
           <a:xfrm>
-            <a:off x="8069375" y="4101508"/>
+            <a:off x="6726258" y="4078744"/>
             <a:ext cx="619938" cy="544605"/>
           </a:xfrm>
           <a:prstGeom prst="rect">
@@ -4232,619 +2948,20 @@
       </p:sp>
       <p:cxnSp>
         <p:nvCxnSpPr>
-          <p:cNvPr id="177" name="Conector angular 176"/>
-          <p:cNvCxnSpPr/>
+          <p:cNvPr id="181" name="Conector angular 180"/>
+          <p:cNvCxnSpPr>
+            <a:stCxn id="85" idx="2"/>
+          </p:cNvCxnSpPr>
           <p:nvPr/>
         </p:nvCxnSpPr>
         <p:spPr>
-          <a:xfrm rot="16200000" flipH="1">
-            <a:off x="2513274" y="1394186"/>
-            <a:ext cx="369946" cy="1078495"/>
+          <a:xfrm rot="5400000">
+            <a:off x="2676897" y="2894472"/>
+            <a:ext cx="2077972" cy="3432"/>
           </a:xfrm>
           <a:prstGeom prst="bentConnector3">
             <a:avLst>
-              <a:gd name="adj1" fmla="val 50000"/>
-            </a:avLst>
-          </a:prstGeom>
-          <a:ln w="12700">
-            <a:solidFill>
-              <a:schemeClr val="tx1"/>
-            </a:solidFill>
-          </a:ln>
-        </p:spPr>
-        <p:style>
-          <a:lnRef idx="1">
-            <a:schemeClr val="accent1"/>
-          </a:lnRef>
-          <a:fillRef idx="0">
-            <a:schemeClr val="accent1"/>
-          </a:fillRef>
-          <a:effectRef idx="0">
-            <a:schemeClr val="accent1"/>
-          </a:effectRef>
-          <a:fontRef idx="minor">
-            <a:schemeClr val="tx1"/>
-          </a:fontRef>
-        </p:style>
-      </p:cxnSp>
-      <p:cxnSp>
-        <p:nvCxnSpPr>
-          <p:cNvPr id="179" name="Conector angular 178"/>
-          <p:cNvCxnSpPr/>
-          <p:nvPr/>
-        </p:nvCxnSpPr>
-        <p:spPr>
-          <a:xfrm rot="5400000">
-            <a:off x="1568112" y="1541288"/>
-            <a:ext cx="384702" cy="781440"/>
-          </a:xfrm>
-          <a:prstGeom prst="bentConnector3">
-            <a:avLst>
-              <a:gd name="adj1" fmla="val 50000"/>
-            </a:avLst>
-          </a:prstGeom>
-          <a:ln w="12700">
-            <a:solidFill>
-              <a:schemeClr val="tx1"/>
-            </a:solidFill>
-          </a:ln>
-        </p:spPr>
-        <p:style>
-          <a:lnRef idx="1">
-            <a:schemeClr val="accent1"/>
-          </a:lnRef>
-          <a:fillRef idx="0">
-            <a:schemeClr val="accent1"/>
-          </a:fillRef>
-          <a:effectRef idx="0">
-            <a:schemeClr val="accent1"/>
-          </a:effectRef>
-          <a:fontRef idx="minor">
-            <a:schemeClr val="tx1"/>
-          </a:fontRef>
-        </p:style>
-      </p:cxnSp>
-      <p:cxnSp>
-        <p:nvCxnSpPr>
-          <p:cNvPr id="180" name="Conector angular 179"/>
-          <p:cNvCxnSpPr>
-            <a:stCxn id="218" idx="2"/>
-            <a:endCxn id="160" idx="0"/>
-          </p:cNvCxnSpPr>
-          <p:nvPr/>
-        </p:nvCxnSpPr>
-        <p:spPr>
-          <a:xfrm rot="16200000" flipH="1">
-            <a:off x="3150102" y="2447772"/>
-            <a:ext cx="214821" cy="145"/>
-          </a:xfrm>
-          <a:prstGeom prst="bentConnector3">
-            <a:avLst>
-              <a:gd name="adj1" fmla="val 50000"/>
-            </a:avLst>
-          </a:prstGeom>
-          <a:ln w="12700">
-            <a:solidFill>
-              <a:schemeClr val="tx1"/>
-            </a:solidFill>
-          </a:ln>
-        </p:spPr>
-        <p:style>
-          <a:lnRef idx="1">
-            <a:schemeClr val="accent1"/>
-          </a:lnRef>
-          <a:fillRef idx="0">
-            <a:schemeClr val="accent1"/>
-          </a:fillRef>
-          <a:effectRef idx="0">
-            <a:schemeClr val="accent1"/>
-          </a:effectRef>
-          <a:fontRef idx="minor">
-            <a:schemeClr val="tx1"/>
-          </a:fontRef>
-        </p:style>
-      </p:cxnSp>
-      <p:cxnSp>
-        <p:nvCxnSpPr>
-          <p:cNvPr id="181" name="Conector angular 180"/>
-          <p:cNvCxnSpPr/>
-          <p:nvPr/>
-        </p:nvCxnSpPr>
-        <p:spPr>
-          <a:xfrm rot="16200000" flipH="1">
-            <a:off x="3316332" y="2383014"/>
-            <a:ext cx="2387148" cy="1075264"/>
-          </a:xfrm>
-          <a:prstGeom prst="bentConnector3">
-            <a:avLst>
-              <a:gd name="adj1" fmla="val 90515"/>
-            </a:avLst>
-          </a:prstGeom>
-          <a:ln w="12700">
-            <a:solidFill>
-              <a:schemeClr val="tx1"/>
-            </a:solidFill>
-          </a:ln>
-        </p:spPr>
-        <p:style>
-          <a:lnRef idx="1">
-            <a:schemeClr val="accent1"/>
-          </a:lnRef>
-          <a:fillRef idx="0">
-            <a:schemeClr val="accent1"/>
-          </a:fillRef>
-          <a:effectRef idx="0">
-            <a:schemeClr val="accent1"/>
-          </a:effectRef>
-          <a:fontRef idx="minor">
-            <a:schemeClr val="tx1"/>
-          </a:fontRef>
-        </p:style>
-      </p:cxnSp>
-      <p:cxnSp>
-        <p:nvCxnSpPr>
-          <p:cNvPr id="234" name="Conector angular 233"/>
-          <p:cNvCxnSpPr>
-            <a:stCxn id="119" idx="0"/>
-            <a:endCxn id="19" idx="2"/>
-          </p:cNvCxnSpPr>
-          <p:nvPr/>
-        </p:nvCxnSpPr>
-        <p:spPr>
-          <a:xfrm rot="16200000" flipV="1">
-            <a:off x="1551592" y="2201104"/>
-            <a:ext cx="203406" cy="511580"/>
-          </a:xfrm>
-          <a:prstGeom prst="bentConnector3">
-            <a:avLst>
-              <a:gd name="adj1" fmla="val 50000"/>
-            </a:avLst>
-          </a:prstGeom>
-          <a:ln w="12700">
-            <a:solidFill>
-              <a:schemeClr val="tx1"/>
-            </a:solidFill>
-          </a:ln>
-        </p:spPr>
-        <p:style>
-          <a:lnRef idx="1">
-            <a:schemeClr val="accent1"/>
-          </a:lnRef>
-          <a:fillRef idx="0">
-            <a:schemeClr val="accent1"/>
-          </a:fillRef>
-          <a:effectRef idx="0">
-            <a:schemeClr val="accent1"/>
-          </a:effectRef>
-          <a:fontRef idx="minor">
-            <a:schemeClr val="tx1"/>
-          </a:fontRef>
-        </p:style>
-      </p:cxnSp>
-      <p:cxnSp>
-        <p:nvCxnSpPr>
-          <p:cNvPr id="235" name="Conector angular 234"/>
-          <p:cNvCxnSpPr>
-            <a:stCxn id="19" idx="2"/>
-            <a:endCxn id="44" idx="0"/>
-          </p:cNvCxnSpPr>
-          <p:nvPr/>
-        </p:nvCxnSpPr>
-        <p:spPr>
-          <a:xfrm rot="5400000">
-            <a:off x="1045299" y="2202135"/>
-            <a:ext cx="199150" cy="505262"/>
-          </a:xfrm>
-          <a:prstGeom prst="bentConnector3">
-            <a:avLst>
-              <a:gd name="adj1" fmla="val 50000"/>
-            </a:avLst>
-          </a:prstGeom>
-          <a:ln w="12700">
-            <a:solidFill>
-              <a:schemeClr val="tx1"/>
-            </a:solidFill>
-          </a:ln>
-        </p:spPr>
-        <p:style>
-          <a:lnRef idx="1">
-            <a:schemeClr val="accent1"/>
-          </a:lnRef>
-          <a:fillRef idx="0">
-            <a:schemeClr val="accent1"/>
-          </a:fillRef>
-          <a:effectRef idx="0">
-            <a:schemeClr val="accent1"/>
-          </a:effectRef>
-          <a:fontRef idx="minor">
-            <a:schemeClr val="tx1"/>
-          </a:fontRef>
-        </p:style>
-      </p:cxnSp>
-      <p:cxnSp>
-        <p:nvCxnSpPr>
-          <p:cNvPr id="247" name="Conector angular 246"/>
-          <p:cNvCxnSpPr/>
-          <p:nvPr/>
-        </p:nvCxnSpPr>
-        <p:spPr>
-          <a:xfrm rot="5400000">
-            <a:off x="879153" y="3243658"/>
-            <a:ext cx="143026" cy="877"/>
-          </a:xfrm>
-          <a:prstGeom prst="bentConnector3">
-            <a:avLst>
-              <a:gd name="adj1" fmla="val 100615"/>
-            </a:avLst>
-          </a:prstGeom>
-          <a:ln w="12700">
-            <a:solidFill>
-              <a:schemeClr val="tx1"/>
-            </a:solidFill>
-          </a:ln>
-        </p:spPr>
-        <p:style>
-          <a:lnRef idx="1">
-            <a:schemeClr val="accent1"/>
-          </a:lnRef>
-          <a:fillRef idx="0">
-            <a:schemeClr val="accent1"/>
-          </a:fillRef>
-          <a:effectRef idx="0">
-            <a:schemeClr val="accent1"/>
-          </a:effectRef>
-          <a:fontRef idx="minor">
-            <a:schemeClr val="tx1"/>
-          </a:fontRef>
-        </p:style>
-      </p:cxnSp>
-      <p:cxnSp>
-        <p:nvCxnSpPr>
-          <p:cNvPr id="251" name="Conector angular 250"/>
-          <p:cNvCxnSpPr/>
-          <p:nvPr/>
-        </p:nvCxnSpPr>
-        <p:spPr>
-          <a:xfrm rot="5400000">
-            <a:off x="886263" y="3700530"/>
-            <a:ext cx="143026" cy="877"/>
-          </a:xfrm>
-          <a:prstGeom prst="bentConnector3">
-            <a:avLst>
-              <a:gd name="adj1" fmla="val 100615"/>
-            </a:avLst>
-          </a:prstGeom>
-          <a:ln w="12700">
-            <a:solidFill>
-              <a:schemeClr val="tx1"/>
-            </a:solidFill>
-          </a:ln>
-        </p:spPr>
-        <p:style>
-          <a:lnRef idx="1">
-            <a:schemeClr val="accent1"/>
-          </a:lnRef>
-          <a:fillRef idx="0">
-            <a:schemeClr val="accent1"/>
-          </a:fillRef>
-          <a:effectRef idx="0">
-            <a:schemeClr val="accent1"/>
-          </a:effectRef>
-          <a:fontRef idx="minor">
-            <a:schemeClr val="tx1"/>
-          </a:fontRef>
-        </p:style>
-      </p:cxnSp>
-      <p:cxnSp>
-        <p:nvCxnSpPr>
-          <p:cNvPr id="252" name="Conector angular 251"/>
-          <p:cNvCxnSpPr/>
-          <p:nvPr/>
-        </p:nvCxnSpPr>
-        <p:spPr>
-          <a:xfrm rot="5400000">
-            <a:off x="873515" y="4584114"/>
-            <a:ext cx="150138" cy="3285"/>
-          </a:xfrm>
-          <a:prstGeom prst="bentConnector3">
-            <a:avLst>
-              <a:gd name="adj1" fmla="val 884"/>
-            </a:avLst>
-          </a:prstGeom>
-          <a:ln w="12700">
-            <a:solidFill>
-              <a:schemeClr val="tx1"/>
-            </a:solidFill>
-          </a:ln>
-        </p:spPr>
-        <p:style>
-          <a:lnRef idx="1">
-            <a:schemeClr val="accent1"/>
-          </a:lnRef>
-          <a:fillRef idx="0">
-            <a:schemeClr val="accent1"/>
-          </a:fillRef>
-          <a:effectRef idx="0">
-            <a:schemeClr val="accent1"/>
-          </a:effectRef>
-          <a:fontRef idx="minor">
-            <a:schemeClr val="tx1"/>
-          </a:fontRef>
-        </p:style>
-      </p:cxnSp>
-      <p:cxnSp>
-        <p:nvCxnSpPr>
-          <p:cNvPr id="253" name="Conector angular 252"/>
-          <p:cNvCxnSpPr/>
-          <p:nvPr/>
-        </p:nvCxnSpPr>
-        <p:spPr>
-          <a:xfrm rot="16200000" flipH="1">
-            <a:off x="840866" y="4911378"/>
-            <a:ext cx="212150" cy="1732"/>
-          </a:xfrm>
-          <a:prstGeom prst="bentConnector3">
-            <a:avLst>
-              <a:gd name="adj1" fmla="val 95187"/>
-            </a:avLst>
-          </a:prstGeom>
-          <a:ln w="12700">
-            <a:solidFill>
-              <a:schemeClr val="tx1"/>
-            </a:solidFill>
-          </a:ln>
-        </p:spPr>
-        <p:style>
-          <a:lnRef idx="1">
-            <a:schemeClr val="accent1"/>
-          </a:lnRef>
-          <a:fillRef idx="0">
-            <a:schemeClr val="accent1"/>
-          </a:fillRef>
-          <a:effectRef idx="0">
-            <a:schemeClr val="accent1"/>
-          </a:effectRef>
-          <a:fontRef idx="minor">
-            <a:schemeClr val="tx1"/>
-          </a:fontRef>
-        </p:style>
-      </p:cxnSp>
-      <p:cxnSp>
-        <p:nvCxnSpPr>
-          <p:cNvPr id="254" name="Conector angular 253"/>
-          <p:cNvCxnSpPr/>
-          <p:nvPr/>
-        </p:nvCxnSpPr>
-        <p:spPr>
-          <a:xfrm rot="16200000" flipH="1">
-            <a:off x="820605" y="5489293"/>
-            <a:ext cx="212150" cy="1732"/>
-          </a:xfrm>
-          <a:prstGeom prst="bentConnector3">
-            <a:avLst>
-              <a:gd name="adj1" fmla="val 95187"/>
-            </a:avLst>
-          </a:prstGeom>
-          <a:ln w="12700">
-            <a:solidFill>
-              <a:schemeClr val="tx1"/>
-            </a:solidFill>
-          </a:ln>
-        </p:spPr>
-        <p:style>
-          <a:lnRef idx="1">
-            <a:schemeClr val="accent1"/>
-          </a:lnRef>
-          <a:fillRef idx="0">
-            <a:schemeClr val="accent1"/>
-          </a:fillRef>
-          <a:effectRef idx="0">
-            <a:schemeClr val="accent1"/>
-          </a:effectRef>
-          <a:fontRef idx="minor">
-            <a:schemeClr val="tx1"/>
-          </a:fontRef>
-        </p:style>
-      </p:cxnSp>
-      <p:cxnSp>
-        <p:nvCxnSpPr>
-          <p:cNvPr id="255" name="Conector angular 254"/>
-          <p:cNvCxnSpPr/>
-          <p:nvPr/>
-        </p:nvCxnSpPr>
-        <p:spPr>
-          <a:xfrm rot="16200000" flipH="1">
-            <a:off x="819142" y="5855922"/>
-            <a:ext cx="212150" cy="1732"/>
-          </a:xfrm>
-          <a:prstGeom prst="bentConnector3">
-            <a:avLst>
-              <a:gd name="adj1" fmla="val 95187"/>
-            </a:avLst>
-          </a:prstGeom>
-          <a:ln w="12700">
-            <a:solidFill>
-              <a:schemeClr val="tx1"/>
-            </a:solidFill>
-          </a:ln>
-        </p:spPr>
-        <p:style>
-          <a:lnRef idx="1">
-            <a:schemeClr val="accent1"/>
-          </a:lnRef>
-          <a:fillRef idx="0">
-            <a:schemeClr val="accent1"/>
-          </a:fillRef>
-          <a:effectRef idx="0">
-            <a:schemeClr val="accent1"/>
-          </a:effectRef>
-          <a:fontRef idx="minor">
-            <a:schemeClr val="tx1"/>
-          </a:fontRef>
-        </p:style>
-      </p:cxnSp>
-      <p:cxnSp>
-        <p:nvCxnSpPr>
-          <p:cNvPr id="320" name="Conector angular 319"/>
-          <p:cNvCxnSpPr/>
-          <p:nvPr/>
-        </p:nvCxnSpPr>
-        <p:spPr>
-          <a:xfrm rot="5400000">
-            <a:off x="1860973" y="2970162"/>
-            <a:ext cx="143025" cy="876"/>
-          </a:xfrm>
-          <a:prstGeom prst="bentConnector3">
-            <a:avLst>
-              <a:gd name="adj1" fmla="val 50000"/>
-            </a:avLst>
-          </a:prstGeom>
-          <a:ln w="12700">
-            <a:solidFill>
-              <a:schemeClr val="tx1"/>
-            </a:solidFill>
-          </a:ln>
-        </p:spPr>
-        <p:style>
-          <a:lnRef idx="1">
-            <a:schemeClr val="accent1"/>
-          </a:lnRef>
-          <a:fillRef idx="0">
-            <a:schemeClr val="accent1"/>
-          </a:fillRef>
-          <a:effectRef idx="0">
-            <a:schemeClr val="accent1"/>
-          </a:effectRef>
-          <a:fontRef idx="minor">
-            <a:schemeClr val="tx1"/>
-          </a:fontRef>
-        </p:style>
-      </p:cxnSp>
-      <p:cxnSp>
-        <p:nvCxnSpPr>
-          <p:cNvPr id="321" name="Conector angular 320"/>
-          <p:cNvCxnSpPr/>
-          <p:nvPr/>
-        </p:nvCxnSpPr>
-        <p:spPr>
-          <a:xfrm rot="5400000">
-            <a:off x="1864073" y="4826195"/>
-            <a:ext cx="150138" cy="3285"/>
-          </a:xfrm>
-          <a:prstGeom prst="bentConnector3">
-            <a:avLst>
-              <a:gd name="adj1" fmla="val 884"/>
-            </a:avLst>
-          </a:prstGeom>
-          <a:ln w="12700">
-            <a:solidFill>
-              <a:schemeClr val="tx1"/>
-            </a:solidFill>
-          </a:ln>
-        </p:spPr>
-        <p:style>
-          <a:lnRef idx="1">
-            <a:schemeClr val="accent1"/>
-          </a:lnRef>
-          <a:fillRef idx="0">
-            <a:schemeClr val="accent1"/>
-          </a:fillRef>
-          <a:effectRef idx="0">
-            <a:schemeClr val="accent1"/>
-          </a:effectRef>
-          <a:fontRef idx="minor">
-            <a:schemeClr val="tx1"/>
-          </a:fontRef>
-        </p:style>
-      </p:cxnSp>
-      <p:cxnSp>
-        <p:nvCxnSpPr>
-          <p:cNvPr id="322" name="Conector angular 321"/>
-          <p:cNvCxnSpPr/>
-          <p:nvPr/>
-        </p:nvCxnSpPr>
-        <p:spPr>
-          <a:xfrm rot="5400000">
-            <a:off x="1864072" y="5157088"/>
-            <a:ext cx="150138" cy="3285"/>
-          </a:xfrm>
-          <a:prstGeom prst="bentConnector3">
-            <a:avLst>
-              <a:gd name="adj1" fmla="val 884"/>
-            </a:avLst>
-          </a:prstGeom>
-          <a:ln w="12700">
-            <a:solidFill>
-              <a:schemeClr val="tx1"/>
-            </a:solidFill>
-          </a:ln>
-        </p:spPr>
-        <p:style>
-          <a:lnRef idx="1">
-            <a:schemeClr val="accent1"/>
-          </a:lnRef>
-          <a:fillRef idx="0">
-            <a:schemeClr val="accent1"/>
-          </a:fillRef>
-          <a:effectRef idx="0">
-            <a:schemeClr val="accent1"/>
-          </a:effectRef>
-          <a:fontRef idx="minor">
-            <a:schemeClr val="tx1"/>
-          </a:fontRef>
-        </p:style>
-      </p:cxnSp>
-      <p:cxnSp>
-        <p:nvCxnSpPr>
-          <p:cNvPr id="323" name="Conector angular 322"/>
-          <p:cNvCxnSpPr/>
-          <p:nvPr/>
-        </p:nvCxnSpPr>
-        <p:spPr>
-          <a:xfrm rot="5400000">
-            <a:off x="1856977" y="5655398"/>
-            <a:ext cx="150138" cy="3285"/>
-          </a:xfrm>
-          <a:prstGeom prst="bentConnector3">
-            <a:avLst>
-              <a:gd name="adj1" fmla="val 884"/>
-            </a:avLst>
-          </a:prstGeom>
-          <a:ln w="12700">
-            <a:solidFill>
-              <a:schemeClr val="tx1"/>
-            </a:solidFill>
-          </a:ln>
-        </p:spPr>
-        <p:style>
-          <a:lnRef idx="1">
-            <a:schemeClr val="accent1"/>
-          </a:lnRef>
-          <a:fillRef idx="0">
-            <a:schemeClr val="accent1"/>
-          </a:fillRef>
-          <a:effectRef idx="0">
-            <a:schemeClr val="accent1"/>
-          </a:effectRef>
-          <a:fontRef idx="minor">
-            <a:schemeClr val="tx1"/>
-          </a:fontRef>
-        </p:style>
-      </p:cxnSp>
-      <p:cxnSp>
-        <p:nvCxnSpPr>
-          <p:cNvPr id="324" name="Conector angular 323"/>
-          <p:cNvCxnSpPr/>
-          <p:nvPr/>
-        </p:nvCxnSpPr>
-        <p:spPr>
-          <a:xfrm rot="5400000">
-            <a:off x="1853691" y="5920639"/>
-            <a:ext cx="150138" cy="3285"/>
-          </a:xfrm>
-          <a:prstGeom prst="bentConnector3">
-            <a:avLst>
-              <a:gd name="adj1" fmla="val 884"/>
+              <a:gd name="adj1" fmla="val -332"/>
             </a:avLst>
           </a:prstGeom>
           <a:ln w="12700">
@@ -4876,12 +2993,12 @@
         </p:nvCxnSpPr>
         <p:spPr>
           <a:xfrm rot="5400000" flipH="1" flipV="1">
-            <a:off x="5551551" y="3620403"/>
+            <a:off x="3601235" y="3571830"/>
             <a:ext cx="5257" cy="1004164"/>
           </a:xfrm>
           <a:prstGeom prst="bentConnector3">
             <a:avLst>
-              <a:gd name="adj1" fmla="val 4448488"/>
+              <a:gd name="adj1" fmla="val 2631177"/>
             </a:avLst>
           </a:prstGeom>
           <a:ln w="12700">
@@ -4915,13 +3032,13 @@
           <p:nvPr/>
         </p:nvCxnSpPr>
         <p:spPr>
-          <a:xfrm rot="5400000">
-            <a:off x="3854401" y="978450"/>
-            <a:ext cx="269394" cy="12700"/>
+          <a:xfrm rot="16200000" flipH="1">
+            <a:off x="3576971" y="1059346"/>
+            <a:ext cx="277057" cy="3919"/>
           </a:xfrm>
           <a:prstGeom prst="bentConnector3">
             <a:avLst>
-              <a:gd name="adj1" fmla="val 99372"/>
+              <a:gd name="adj1" fmla="val 97457"/>
             </a:avLst>
           </a:prstGeom>
           <a:ln w="12700">
@@ -4955,13 +3072,13 @@
           <p:nvPr/>
         </p:nvCxnSpPr>
         <p:spPr>
-          <a:xfrm rot="5400000">
-            <a:off x="3916901" y="1445069"/>
-            <a:ext cx="138044" cy="6350"/>
+          <a:xfrm rot="16200000" flipH="1">
+            <a:off x="3629605" y="1553764"/>
+            <a:ext cx="175848" cy="140"/>
           </a:xfrm>
           <a:prstGeom prst="bentConnector3">
             <a:avLst>
-              <a:gd name="adj1" fmla="val 6326"/>
+              <a:gd name="adj1" fmla="val 50000"/>
             </a:avLst>
           </a:prstGeom>
           <a:ln w="12700">
@@ -4993,7 +3110,7 @@
         </p:nvSpPr>
         <p:spPr>
           <a:xfrm>
-            <a:off x="4770360" y="4549061"/>
+            <a:off x="3821572" y="4436140"/>
             <a:ext cx="558588" cy="230832"/>
           </a:xfrm>
           <a:prstGeom prst="rect">
@@ -5026,8 +3143,8 @@
         </p:nvSpPr>
         <p:spPr>
           <a:xfrm>
-            <a:off x="5895017" y="4508137"/>
-            <a:ext cx="558588" cy="230832"/>
+            <a:off x="4811774" y="4451110"/>
+            <a:ext cx="551566" cy="230832"/>
           </a:xfrm>
           <a:prstGeom prst="rect">
             <a:avLst/>
@@ -5051,126 +3168,6 @@
           </a:p>
         </p:txBody>
       </p:sp>
-      <p:cxnSp>
-        <p:nvCxnSpPr>
-          <p:cNvPr id="332" name="Conector angular 331"/>
-          <p:cNvCxnSpPr>
-            <a:stCxn id="222" idx="0"/>
-            <a:endCxn id="220" idx="2"/>
-          </p:cNvCxnSpPr>
-          <p:nvPr/>
-        </p:nvCxnSpPr>
-        <p:spPr>
-          <a:xfrm rot="16200000" flipV="1">
-            <a:off x="3924071" y="4457625"/>
-            <a:ext cx="107188" cy="8792"/>
-          </a:xfrm>
-          <a:prstGeom prst="bentConnector3">
-            <a:avLst>
-              <a:gd name="adj1" fmla="val 96873"/>
-            </a:avLst>
-          </a:prstGeom>
-          <a:ln w="12700">
-            <a:solidFill>
-              <a:schemeClr val="tx1"/>
-            </a:solidFill>
-          </a:ln>
-        </p:spPr>
-        <p:style>
-          <a:lnRef idx="1">
-            <a:schemeClr val="accent1"/>
-          </a:lnRef>
-          <a:fillRef idx="0">
-            <a:schemeClr val="accent1"/>
-          </a:fillRef>
-          <a:effectRef idx="0">
-            <a:schemeClr val="accent1"/>
-          </a:effectRef>
-          <a:fontRef idx="minor">
-            <a:schemeClr val="tx1"/>
-          </a:fontRef>
-        </p:style>
-      </p:cxnSp>
-      <p:cxnSp>
-        <p:nvCxnSpPr>
-          <p:cNvPr id="333" name="Conector angular 332"/>
-          <p:cNvCxnSpPr>
-            <a:stCxn id="330" idx="0"/>
-            <a:endCxn id="170" idx="2"/>
-          </p:cNvCxnSpPr>
-          <p:nvPr/>
-        </p:nvCxnSpPr>
-        <p:spPr>
-          <a:xfrm rot="5400000" flipH="1" flipV="1">
-            <a:off x="4981145" y="4472194"/>
-            <a:ext cx="145377" cy="8358"/>
-          </a:xfrm>
-          <a:prstGeom prst="bentConnector3">
-            <a:avLst>
-              <a:gd name="adj1" fmla="val 94928"/>
-            </a:avLst>
-          </a:prstGeom>
-          <a:ln w="12700">
-            <a:solidFill>
-              <a:schemeClr val="tx1"/>
-            </a:solidFill>
-          </a:ln>
-        </p:spPr>
-        <p:style>
-          <a:lnRef idx="1">
-            <a:schemeClr val="accent1"/>
-          </a:lnRef>
-          <a:fillRef idx="0">
-            <a:schemeClr val="accent1"/>
-          </a:fillRef>
-          <a:effectRef idx="0">
-            <a:schemeClr val="accent1"/>
-          </a:effectRef>
-          <a:fontRef idx="minor">
-            <a:schemeClr val="tx1"/>
-          </a:fontRef>
-        </p:style>
-      </p:cxnSp>
-      <p:cxnSp>
-        <p:nvCxnSpPr>
-          <p:cNvPr id="334" name="Conector angular 333"/>
-          <p:cNvCxnSpPr>
-            <a:stCxn id="331" idx="0"/>
-            <a:endCxn id="173" idx="2"/>
-          </p:cNvCxnSpPr>
-          <p:nvPr/>
-        </p:nvCxnSpPr>
-        <p:spPr>
-          <a:xfrm rot="16200000" flipV="1">
-            <a:off x="6113628" y="4447454"/>
-            <a:ext cx="118314" cy="3052"/>
-          </a:xfrm>
-          <a:prstGeom prst="bentConnector3">
-            <a:avLst>
-              <a:gd name="adj1" fmla="val 96711"/>
-            </a:avLst>
-          </a:prstGeom>
-          <a:ln w="12700">
-            <a:solidFill>
-              <a:schemeClr val="tx1"/>
-            </a:solidFill>
-          </a:ln>
-        </p:spPr>
-        <p:style>
-          <a:lnRef idx="1">
-            <a:schemeClr val="accent1"/>
-          </a:lnRef>
-          <a:fillRef idx="0">
-            <a:schemeClr val="accent1"/>
-          </a:fillRef>
-          <a:effectRef idx="0">
-            <a:schemeClr val="accent1"/>
-          </a:effectRef>
-          <a:fontRef idx="minor">
-            <a:schemeClr val="tx1"/>
-          </a:fontRef>
-        </p:style>
-      </p:cxnSp>
       <p:cxnSp>
         <p:nvCxnSpPr>
           <p:cNvPr id="364" name="Conector angular 363"/>
@@ -5182,92 +3179,12 @@
         </p:nvCxnSpPr>
         <p:spPr>
           <a:xfrm rot="16200000" flipH="1">
-            <a:off x="4979039" y="4850507"/>
-            <a:ext cx="141852" cy="623"/>
+            <a:off x="4013924" y="4753914"/>
+            <a:ext cx="182266" cy="8382"/>
           </a:xfrm>
           <a:prstGeom prst="bentConnector3">
             <a:avLst>
-              <a:gd name="adj1" fmla="val 50000"/>
-            </a:avLst>
-          </a:prstGeom>
-          <a:ln w="12700">
-            <a:solidFill>
-              <a:schemeClr val="tx1"/>
-            </a:solidFill>
-          </a:ln>
-        </p:spPr>
-        <p:style>
-          <a:lnRef idx="1">
-            <a:schemeClr val="accent1"/>
-          </a:lnRef>
-          <a:fillRef idx="0">
-            <a:schemeClr val="accent1"/>
-          </a:fillRef>
-          <a:effectRef idx="0">
-            <a:schemeClr val="accent1"/>
-          </a:effectRef>
-          <a:fontRef idx="minor">
-            <a:schemeClr val="tx1"/>
-          </a:fontRef>
-        </p:style>
-      </p:cxnSp>
-      <p:cxnSp>
-        <p:nvCxnSpPr>
-          <p:cNvPr id="365" name="Conector angular 364"/>
-          <p:cNvCxnSpPr>
-            <a:stCxn id="222" idx="2"/>
-            <a:endCxn id="256" idx="0"/>
-          </p:cNvCxnSpPr>
-          <p:nvPr/>
-        </p:nvCxnSpPr>
-        <p:spPr>
-          <a:xfrm rot="5400000">
-            <a:off x="3888836" y="4828520"/>
-            <a:ext cx="175298" cy="11152"/>
-          </a:xfrm>
-          <a:prstGeom prst="bentConnector3">
-            <a:avLst>
-              <a:gd name="adj1" fmla="val 98723"/>
-            </a:avLst>
-          </a:prstGeom>
-          <a:ln w="12700">
-            <a:solidFill>
-              <a:schemeClr val="tx1"/>
-            </a:solidFill>
-          </a:ln>
-        </p:spPr>
-        <p:style>
-          <a:lnRef idx="1">
-            <a:schemeClr val="accent1"/>
-          </a:lnRef>
-          <a:fillRef idx="0">
-            <a:schemeClr val="accent1"/>
-          </a:fillRef>
-          <a:effectRef idx="0">
-            <a:schemeClr val="accent1"/>
-          </a:effectRef>
-          <a:fontRef idx="minor">
-            <a:schemeClr val="tx1"/>
-          </a:fontRef>
-        </p:style>
-      </p:cxnSp>
-      <p:cxnSp>
-        <p:nvCxnSpPr>
-          <p:cNvPr id="367" name="Conector angular 366"/>
-          <p:cNvCxnSpPr>
-            <a:stCxn id="331" idx="2"/>
-            <a:endCxn id="101" idx="0"/>
-          </p:cNvCxnSpPr>
-          <p:nvPr/>
-        </p:nvCxnSpPr>
-        <p:spPr>
-          <a:xfrm rot="5400000">
-            <a:off x="6091001" y="4821671"/>
-            <a:ext cx="166012" cy="608"/>
-          </a:xfrm>
-          <a:prstGeom prst="bentConnector3">
-            <a:avLst>
-              <a:gd name="adj1" fmla="val 50000"/>
+              <a:gd name="adj1" fmla="val 100362"/>
             </a:avLst>
           </a:prstGeom>
           <a:ln w="12700">
@@ -5299,7 +3216,7 @@
         </p:nvCxnSpPr>
         <p:spPr>
           <a:xfrm rot="10800000" flipV="1">
-            <a:off x="5211536" y="967778"/>
+            <a:off x="4970013" y="1038150"/>
             <a:ext cx="1909895" cy="158265"/>
           </a:xfrm>
           <a:prstGeom prst="bentConnector3">
@@ -5336,7 +3253,7 @@
         </p:nvCxnSpPr>
         <p:spPr>
           <a:xfrm rot="16200000" flipH="1">
-            <a:off x="5168875" y="1452932"/>
+            <a:off x="4940808" y="1525592"/>
             <a:ext cx="106251" cy="3461"/>
           </a:xfrm>
           <a:prstGeom prst="bentConnector3">
@@ -5376,7 +3293,7 @@
         </p:nvCxnSpPr>
         <p:spPr>
           <a:xfrm rot="5400000">
-            <a:off x="5144146" y="1801071"/>
+            <a:off x="4916079" y="1873731"/>
             <a:ext cx="151197" cy="7974"/>
           </a:xfrm>
           <a:prstGeom prst="bentConnector3">
@@ -5413,7 +3330,7 @@
         </p:nvCxnSpPr>
         <p:spPr>
           <a:xfrm rot="5400000">
-            <a:off x="5145523" y="2466751"/>
+            <a:off x="4917456" y="2539411"/>
             <a:ext cx="138754" cy="1713"/>
           </a:xfrm>
           <a:prstGeom prst="bentConnector3">
@@ -5453,7 +3370,7 @@
         </p:nvCxnSpPr>
         <p:spPr>
           <a:xfrm rot="5400000">
-            <a:off x="5126329" y="2840256"/>
+            <a:off x="4898262" y="2912916"/>
             <a:ext cx="169614" cy="5817"/>
           </a:xfrm>
           <a:prstGeom prst="bentConnector3">
@@ -5493,12 +3410,12 @@
         </p:nvCxnSpPr>
         <p:spPr>
           <a:xfrm rot="5400000">
-            <a:off x="6427644" y="1439269"/>
-            <a:ext cx="104220" cy="4291"/>
+            <a:off x="6192617" y="1519233"/>
+            <a:ext cx="118484" cy="3947"/>
           </a:xfrm>
           <a:prstGeom prst="bentConnector3">
             <a:avLst>
-              <a:gd name="adj1" fmla="val 1789"/>
+              <a:gd name="adj1" fmla="val 50000"/>
             </a:avLst>
           </a:prstGeom>
           <a:ln w="12700">
@@ -5533,12 +3450,12 @@
         </p:nvCxnSpPr>
         <p:spPr>
           <a:xfrm rot="5400000">
-            <a:off x="6397320" y="1802472"/>
-            <a:ext cx="158404" cy="2172"/>
+            <a:off x="6176557" y="1882092"/>
+            <a:ext cx="144140" cy="2516"/>
           </a:xfrm>
           <a:prstGeom prst="bentConnector3">
             <a:avLst>
-              <a:gd name="adj1" fmla="val 97576"/>
+              <a:gd name="adj1" fmla="val 50000"/>
             </a:avLst>
           </a:prstGeom>
           <a:ln w="12700">
@@ -5573,7 +3490,7 @@
         </p:nvCxnSpPr>
         <p:spPr>
           <a:xfrm rot="5400000">
-            <a:off x="7547648" y="1439906"/>
+            <a:off x="7319581" y="1512566"/>
             <a:ext cx="116608" cy="829"/>
           </a:xfrm>
           <a:prstGeom prst="bentConnector3">
@@ -5613,7 +3530,7 @@
         </p:nvCxnSpPr>
         <p:spPr>
           <a:xfrm rot="5400000">
-            <a:off x="7531129" y="1803744"/>
+            <a:off x="7303062" y="1876404"/>
             <a:ext cx="148693" cy="125"/>
           </a:xfrm>
           <a:prstGeom prst="bentConnector3">
@@ -5650,7 +3567,7 @@
         </p:nvSpPr>
         <p:spPr>
           <a:xfrm>
-            <a:off x="8439313" y="1498624"/>
+            <a:off x="8211246" y="1571284"/>
             <a:ext cx="376254" cy="230836"/>
           </a:xfrm>
           <a:prstGeom prst="rect">
@@ -5683,7 +3600,7 @@
         </p:nvCxnSpPr>
         <p:spPr>
           <a:xfrm rot="5400000">
-            <a:off x="8562897" y="1447291"/>
+            <a:off x="8334830" y="1519951"/>
             <a:ext cx="118073" cy="7225"/>
           </a:xfrm>
           <a:prstGeom prst="bentConnector3">
@@ -5717,13 +3634,12 @@
           <p:cNvPr id="383" name="Conector angular 382"/>
           <p:cNvCxnSpPr>
             <a:stCxn id="381" idx="2"/>
-            <a:endCxn id="175" idx="0"/>
           </p:cNvCxnSpPr>
           <p:nvPr/>
         </p:nvCxnSpPr>
         <p:spPr>
           <a:xfrm rot="16200000" flipH="1">
-            <a:off x="8554553" y="1802347"/>
+            <a:off x="8326486" y="1875007"/>
             <a:ext cx="145942" cy="168"/>
           </a:xfrm>
           <a:prstGeom prst="bentConnector3">
@@ -5760,7 +3676,7 @@
         </p:nvSpPr>
         <p:spPr>
           <a:xfrm>
-            <a:off x="5697594" y="5816224"/>
+            <a:off x="4654203" y="5899410"/>
             <a:ext cx="961635" cy="230832"/>
           </a:xfrm>
           <a:prstGeom prst="rect">
@@ -5793,7 +3709,7 @@
         </p:nvSpPr>
         <p:spPr>
           <a:xfrm>
-            <a:off x="5800690" y="6271681"/>
+            <a:off x="4723689" y="6241218"/>
             <a:ext cx="759604" cy="434243"/>
           </a:xfrm>
           <a:prstGeom prst="rect">
@@ -5859,172 +3775,18 @@
       </p:sp>
       <p:cxnSp>
         <p:nvCxnSpPr>
-          <p:cNvPr id="386" name="Conector angular 385"/>
+          <p:cNvPr id="138" name="Conector angular 137"/>
           <p:cNvCxnSpPr/>
           <p:nvPr/>
         </p:nvCxnSpPr>
         <p:spPr>
-          <a:xfrm rot="16200000" flipV="1">
-            <a:off x="6105665" y="5760650"/>
-            <a:ext cx="131364" cy="4709"/>
+          <a:xfrm rot="5400000" flipH="1" flipV="1">
+            <a:off x="5588666" y="3530345"/>
+            <a:ext cx="4925" cy="1075915"/>
           </a:xfrm>
           <a:prstGeom prst="bentConnector3">
             <a:avLst>
-              <a:gd name="adj1" fmla="val 103543"/>
-            </a:avLst>
-          </a:prstGeom>
-          <a:ln w="12700">
-            <a:solidFill>
-              <a:schemeClr val="tx1"/>
-            </a:solidFill>
-          </a:ln>
-        </p:spPr>
-        <p:style>
-          <a:lnRef idx="1">
-            <a:schemeClr val="accent1"/>
-          </a:lnRef>
-          <a:fillRef idx="0">
-            <a:schemeClr val="accent1"/>
-          </a:fillRef>
-          <a:effectRef idx="0">
-            <a:schemeClr val="accent1"/>
-          </a:effectRef>
-          <a:fontRef idx="minor">
-            <a:schemeClr val="tx1"/>
-          </a:fontRef>
-        </p:style>
-      </p:cxnSp>
-      <p:cxnSp>
-        <p:nvCxnSpPr>
-          <p:cNvPr id="387" name="Conector angular 386"/>
-          <p:cNvCxnSpPr>
-            <a:stCxn id="385" idx="0"/>
-            <a:endCxn id="384" idx="2"/>
-          </p:cNvCxnSpPr>
-          <p:nvPr/>
-        </p:nvCxnSpPr>
-        <p:spPr>
-          <a:xfrm rot="16200000" flipV="1">
-            <a:off x="6067140" y="6158329"/>
-            <a:ext cx="224625" cy="2080"/>
-          </a:xfrm>
-          <a:prstGeom prst="bentConnector3">
-            <a:avLst>
-              <a:gd name="adj1" fmla="val 50000"/>
-            </a:avLst>
-          </a:prstGeom>
-          <a:ln w="12700">
-            <a:solidFill>
-              <a:schemeClr val="tx1"/>
-            </a:solidFill>
-          </a:ln>
-        </p:spPr>
-        <p:style>
-          <a:lnRef idx="1">
-            <a:schemeClr val="accent1"/>
-          </a:lnRef>
-          <a:fillRef idx="0">
-            <a:schemeClr val="accent1"/>
-          </a:fillRef>
-          <a:effectRef idx="0">
-            <a:schemeClr val="accent1"/>
-          </a:effectRef>
-          <a:fontRef idx="minor">
-            <a:schemeClr val="tx1"/>
-          </a:fontRef>
-        </p:style>
-      </p:cxnSp>
-      <p:cxnSp>
-        <p:nvCxnSpPr>
-          <p:cNvPr id="132" name="Conector angular 131"/>
-          <p:cNvCxnSpPr>
-            <a:endCxn id="220" idx="0"/>
-          </p:cNvCxnSpPr>
-          <p:nvPr/>
-        </p:nvCxnSpPr>
-        <p:spPr>
-          <a:xfrm rot="5400000">
-            <a:off x="3863219" y="4006502"/>
-            <a:ext cx="228892" cy="8792"/>
-          </a:xfrm>
-          <a:prstGeom prst="bentConnector3">
-            <a:avLst>
-              <a:gd name="adj1" fmla="val -4875"/>
-            </a:avLst>
-          </a:prstGeom>
-          <a:ln w="12700">
-            <a:solidFill>
-              <a:schemeClr val="tx1"/>
-            </a:solidFill>
-          </a:ln>
-        </p:spPr>
-        <p:style>
-          <a:lnRef idx="1">
-            <a:schemeClr val="accent1"/>
-          </a:lnRef>
-          <a:fillRef idx="0">
-            <a:schemeClr val="accent1"/>
-          </a:fillRef>
-          <a:effectRef idx="0">
-            <a:schemeClr val="accent1"/>
-          </a:effectRef>
-          <a:fontRef idx="minor">
-            <a:schemeClr val="tx1"/>
-          </a:fontRef>
-        </p:style>
-      </p:cxnSp>
-      <p:cxnSp>
-        <p:nvCxnSpPr>
-          <p:cNvPr id="138" name="Conector angular 137"/>
-          <p:cNvCxnSpPr/>
-          <p:nvPr/>
-        </p:nvCxnSpPr>
-        <p:spPr>
-          <a:xfrm rot="5400000" flipH="1" flipV="1">
-            <a:off x="7995562" y="3606439"/>
-            <a:ext cx="5257" cy="1004164"/>
-          </a:xfrm>
-          <a:prstGeom prst="bentConnector3">
-            <a:avLst>
-              <a:gd name="adj1" fmla="val 4161670"/>
-            </a:avLst>
-          </a:prstGeom>
-          <a:ln w="12700">
-            <a:solidFill>
-              <a:schemeClr val="tx1"/>
-            </a:solidFill>
-          </a:ln>
-        </p:spPr>
-        <p:style>
-          <a:lnRef idx="1">
-            <a:schemeClr val="accent1"/>
-          </a:lnRef>
-          <a:fillRef idx="0">
-            <a:schemeClr val="accent1"/>
-          </a:fillRef>
-          <a:effectRef idx="0">
-            <a:schemeClr val="accent1"/>
-          </a:effectRef>
-          <a:fontRef idx="minor">
-            <a:schemeClr val="tx1"/>
-          </a:fontRef>
-        </p:style>
-      </p:cxnSp>
-      <p:cxnSp>
-        <p:nvCxnSpPr>
-          <p:cNvPr id="139" name="Conector angular 138"/>
-          <p:cNvCxnSpPr/>
-          <p:nvPr/>
-        </p:nvCxnSpPr>
-        <p:spPr>
-          <a:xfrm flipV="1">
-            <a:off x="6056262" y="4101509"/>
-            <a:ext cx="1439846" cy="11130"/>
-          </a:xfrm>
-          <a:prstGeom prst="bentConnector4">
-            <a:avLst>
-              <a:gd name="adj1" fmla="val 155"/>
-              <a:gd name="adj2" fmla="val 1973351"/>
+              <a:gd name="adj1" fmla="val 2773503"/>
             </a:avLst>
           </a:prstGeom>
           <a:ln w="12700">
@@ -6056,7 +3818,7 @@
         </p:nvCxnSpPr>
         <p:spPr>
           <a:xfrm rot="5400000">
-            <a:off x="6394126" y="1062428"/>
+            <a:off x="6166059" y="1135088"/>
             <a:ext cx="158404" cy="2172"/>
           </a:xfrm>
           <a:prstGeom prst="bentConnector3">
@@ -6093,12 +3855,12 @@
         </p:nvCxnSpPr>
         <p:spPr>
           <a:xfrm rot="5400000">
-            <a:off x="3910640" y="612815"/>
-            <a:ext cx="169614" cy="5817"/>
+            <a:off x="3609470" y="639731"/>
+            <a:ext cx="202325" cy="5817"/>
           </a:xfrm>
           <a:prstGeom prst="bentConnector3">
             <a:avLst>
-              <a:gd name="adj1" fmla="val -358"/>
+              <a:gd name="adj1" fmla="val 4349"/>
             </a:avLst>
           </a:prstGeom>
           <a:ln w="12700">
@@ -6132,12 +3894,1291 @@
         </p:nvCxnSpPr>
         <p:spPr>
           <a:xfrm rot="16200000" flipH="1">
-            <a:off x="7524461" y="1058570"/>
+            <a:off x="7296394" y="1131230"/>
             <a:ext cx="162857" cy="954"/>
           </a:xfrm>
           <a:prstGeom prst="bentConnector3">
             <a:avLst>
               <a:gd name="adj1" fmla="val 639"/>
+            </a:avLst>
+          </a:prstGeom>
+          <a:ln w="12700">
+            <a:solidFill>
+              <a:schemeClr val="tx1"/>
+            </a:solidFill>
+          </a:ln>
+        </p:spPr>
+        <p:style>
+          <a:lnRef idx="1">
+            <a:schemeClr val="accent1"/>
+          </a:lnRef>
+          <a:fillRef idx="0">
+            <a:schemeClr val="accent1"/>
+          </a:fillRef>
+          <a:effectRef idx="0">
+            <a:schemeClr val="accent1"/>
+          </a:effectRef>
+          <a:fontRef idx="minor">
+            <a:schemeClr val="tx1"/>
+          </a:fontRef>
+        </p:style>
+      </p:cxnSp>
+      <p:sp>
+        <p:nvSpPr>
+          <p:cNvPr id="111" name="CuadroTexto 110" descr="Conector entre nodos" title="conector"/>
+          <p:cNvSpPr txBox="1"/>
+          <p:nvPr/>
+        </p:nvSpPr>
+        <p:spPr>
+          <a:xfrm>
+            <a:off x="342092" y="1717230"/>
+            <a:ext cx="1418919" cy="230832"/>
+          </a:xfrm>
+          <a:prstGeom prst="rect">
+            <a:avLst/>
+          </a:prstGeom>
+          <a:noFill/>
+        </p:spPr>
+        <p:txBody>
+          <a:bodyPr wrap="square" rtlCol="0">
+            <a:spAutoFit/>
+          </a:bodyPr>
+          <a:lstStyle/>
+          <a:p>
+            <a:pPr algn="ctr"/>
+            <a:r>
+              <a:rPr lang="es-ES" sz="900" dirty="0" smtClean="0">
+                <a:latin typeface="Arial" panose="020B0604020202020204" pitchFamily="34" charset="0"/>
+                <a:cs typeface="Arial" panose="020B0604020202020204" pitchFamily="34" charset="0"/>
+              </a:rPr>
+              <a:t>en las cuales</a:t>
+            </a:r>
+            <a:endParaRPr lang="es-ES" sz="900" dirty="0">
+              <a:latin typeface="Arial" panose="020B0604020202020204" pitchFamily="34" charset="0"/>
+              <a:cs typeface="Arial" panose="020B0604020202020204" pitchFamily="34" charset="0"/>
+            </a:endParaRPr>
+          </a:p>
+        </p:txBody>
+      </p:sp>
+      <p:sp>
+        <p:nvSpPr>
+          <p:cNvPr id="113" name="Rectángulo 112" descr="Nodo de segundo nivel" title="Nodo02"/>
+          <p:cNvSpPr/>
+          <p:nvPr/>
+        </p:nvSpPr>
+        <p:spPr>
+          <a:xfrm>
+            <a:off x="513965" y="2036265"/>
+            <a:ext cx="1075174" cy="497217"/>
+          </a:xfrm>
+          <a:prstGeom prst="rect">
+            <a:avLst/>
+          </a:prstGeom>
+          <a:solidFill>
+            <a:schemeClr val="bg2">
+              <a:lumMod val="50000"/>
+            </a:schemeClr>
+          </a:solidFill>
+          <a:ln>
+            <a:solidFill>
+              <a:schemeClr val="tx1"/>
+            </a:solidFill>
+          </a:ln>
+        </p:spPr>
+        <p:style>
+          <a:lnRef idx="2">
+            <a:schemeClr val="accent6"/>
+          </a:lnRef>
+          <a:fillRef idx="1">
+            <a:schemeClr val="lt1"/>
+          </a:fillRef>
+          <a:effectRef idx="0">
+            <a:schemeClr val="accent6"/>
+          </a:effectRef>
+          <a:fontRef idx="minor">
+            <a:schemeClr val="dk1"/>
+          </a:fontRef>
+        </p:style>
+        <p:txBody>
+          <a:bodyPr rtlCol="0" anchor="ctr"/>
+          <a:lstStyle/>
+          <a:p>
+            <a:pPr algn="ctr"/>
+            <a:r>
+              <a:rPr lang="es-CO" sz="900" dirty="0" smtClean="0">
+                <a:solidFill>
+                  <a:schemeClr val="bg1"/>
+                </a:solidFill>
+                <a:latin typeface="Arial" panose="020B0604020202020204" pitchFamily="34" charset="0"/>
+                <a:cs typeface="Arial" panose="020B0604020202020204" pitchFamily="34" charset="0"/>
+              </a:rPr>
+              <a:t>se relacionan los elementos de dos conjuntos</a:t>
+            </a:r>
+            <a:endParaRPr lang="es-ES" sz="900" dirty="0">
+              <a:solidFill>
+                <a:schemeClr val="bg1"/>
+              </a:solidFill>
+              <a:latin typeface="Arial" panose="020B0604020202020204" pitchFamily="34" charset="0"/>
+              <a:cs typeface="Arial" panose="020B0604020202020204" pitchFamily="34" charset="0"/>
+            </a:endParaRPr>
+          </a:p>
+        </p:txBody>
+      </p:sp>
+      <p:sp>
+        <p:nvSpPr>
+          <p:cNvPr id="127" name="CuadroTexto 126" descr="Conector entre nodos" title="conector"/>
+          <p:cNvSpPr txBox="1"/>
+          <p:nvPr/>
+        </p:nvSpPr>
+        <p:spPr>
+          <a:xfrm>
+            <a:off x="286831" y="2684992"/>
+            <a:ext cx="1418919" cy="230832"/>
+          </a:xfrm>
+          <a:prstGeom prst="rect">
+            <a:avLst/>
+          </a:prstGeom>
+          <a:noFill/>
+        </p:spPr>
+        <p:txBody>
+          <a:bodyPr wrap="square" rtlCol="0">
+            <a:spAutoFit/>
+          </a:bodyPr>
+          <a:lstStyle/>
+          <a:p>
+            <a:pPr algn="ctr"/>
+            <a:r>
+              <a:rPr lang="es-ES" sz="900" dirty="0" smtClean="0">
+                <a:latin typeface="Arial" panose="020B0604020202020204" pitchFamily="34" charset="0"/>
+                <a:cs typeface="Arial" panose="020B0604020202020204" pitchFamily="34" charset="0"/>
+              </a:rPr>
+              <a:t>de manera que</a:t>
+            </a:r>
+            <a:endParaRPr lang="es-ES" sz="900" dirty="0">
+              <a:latin typeface="Arial" panose="020B0604020202020204" pitchFamily="34" charset="0"/>
+              <a:cs typeface="Arial" panose="020B0604020202020204" pitchFamily="34" charset="0"/>
+            </a:endParaRPr>
+          </a:p>
+        </p:txBody>
+      </p:sp>
+      <p:sp>
+        <p:nvSpPr>
+          <p:cNvPr id="128" name="Rectángulo 127" descr="Nodo de tercer nivel" title="Nodo03"/>
+          <p:cNvSpPr/>
+          <p:nvPr/>
+        </p:nvSpPr>
+        <p:spPr>
+          <a:xfrm>
+            <a:off x="340212" y="3016006"/>
+            <a:ext cx="1397689" cy="1141252"/>
+          </a:xfrm>
+          <a:prstGeom prst="rect">
+            <a:avLst/>
+          </a:prstGeom>
+          <a:solidFill>
+            <a:schemeClr val="bg2">
+              <a:lumMod val="90000"/>
+            </a:schemeClr>
+          </a:solidFill>
+          <a:ln>
+            <a:solidFill>
+              <a:schemeClr val="tx1"/>
+            </a:solidFill>
+          </a:ln>
+        </p:spPr>
+        <p:style>
+          <a:lnRef idx="2">
+            <a:schemeClr val="accent6"/>
+          </a:lnRef>
+          <a:fillRef idx="1">
+            <a:schemeClr val="lt1"/>
+          </a:fillRef>
+          <a:effectRef idx="0">
+            <a:schemeClr val="accent6"/>
+          </a:effectRef>
+          <a:fontRef idx="minor">
+            <a:schemeClr val="dk1"/>
+          </a:fontRef>
+        </p:style>
+        <p:txBody>
+          <a:bodyPr rtlCol="0" anchor="ctr"/>
+          <a:lstStyle/>
+          <a:p>
+            <a:r>
+              <a:rPr lang="es-ES" sz="900" dirty="0" smtClean="0">
+                <a:solidFill>
+                  <a:schemeClr val="tx1"/>
+                </a:solidFill>
+                <a:latin typeface="Arial" panose="020B0604020202020204" pitchFamily="34" charset="0"/>
+                <a:cs typeface="Arial" panose="020B0604020202020204" pitchFamily="34" charset="0"/>
+              </a:rPr>
+              <a:t>a cada elemento del primer conjunto llamado dominio, le corresponde solo un elemento del segundo conjunto llamado recorrido o </a:t>
+            </a:r>
+            <a:r>
+              <a:rPr lang="es-ES" sz="900" dirty="0" err="1" smtClean="0">
+                <a:solidFill>
+                  <a:schemeClr val="tx1"/>
+                </a:solidFill>
+                <a:latin typeface="Arial" panose="020B0604020202020204" pitchFamily="34" charset="0"/>
+                <a:cs typeface="Arial" panose="020B0604020202020204" pitchFamily="34" charset="0"/>
+              </a:rPr>
+              <a:t>codominio</a:t>
+            </a:r>
+            <a:endParaRPr lang="es-ES" sz="900" dirty="0">
+              <a:solidFill>
+                <a:schemeClr val="tx1"/>
+              </a:solidFill>
+              <a:latin typeface="Arial" panose="020B0604020202020204" pitchFamily="34" charset="0"/>
+              <a:cs typeface="Arial" panose="020B0604020202020204" pitchFamily="34" charset="0"/>
+            </a:endParaRPr>
+          </a:p>
+        </p:txBody>
+      </p:sp>
+      <p:sp>
+        <p:nvSpPr>
+          <p:cNvPr id="129" name="CuadroTexto 128" descr="Conector entre nodos" title="conector"/>
+          <p:cNvSpPr txBox="1"/>
+          <p:nvPr/>
+        </p:nvSpPr>
+        <p:spPr>
+          <a:xfrm>
+            <a:off x="435746" y="4211204"/>
+            <a:ext cx="1162272" cy="230832"/>
+          </a:xfrm>
+          <a:prstGeom prst="rect">
+            <a:avLst/>
+          </a:prstGeom>
+          <a:noFill/>
+        </p:spPr>
+        <p:txBody>
+          <a:bodyPr wrap="square" rtlCol="0">
+            <a:spAutoFit/>
+          </a:bodyPr>
+          <a:lstStyle/>
+          <a:p>
+            <a:pPr algn="ctr"/>
+            <a:r>
+              <a:rPr lang="es-ES" sz="900" dirty="0" smtClean="0">
+                <a:latin typeface="Arial" panose="020B0604020202020204" pitchFamily="34" charset="0"/>
+                <a:cs typeface="Arial" panose="020B0604020202020204" pitchFamily="34" charset="0"/>
+              </a:rPr>
+              <a:t>se identifican como</a:t>
+            </a:r>
+            <a:endParaRPr lang="es-ES" sz="900" dirty="0">
+              <a:latin typeface="Arial" panose="020B0604020202020204" pitchFamily="34" charset="0"/>
+              <a:cs typeface="Arial" panose="020B0604020202020204" pitchFamily="34" charset="0"/>
+            </a:endParaRPr>
+          </a:p>
+        </p:txBody>
+      </p:sp>
+      <p:cxnSp>
+        <p:nvCxnSpPr>
+          <p:cNvPr id="133" name="Conector angular 132"/>
+          <p:cNvCxnSpPr/>
+          <p:nvPr/>
+        </p:nvCxnSpPr>
+        <p:spPr>
+          <a:xfrm rot="5400000" flipH="1" flipV="1">
+            <a:off x="1014254" y="4118638"/>
+            <a:ext cx="5257" cy="1004164"/>
+          </a:xfrm>
+          <a:prstGeom prst="bentConnector3">
+            <a:avLst>
+              <a:gd name="adj1" fmla="val 2371562"/>
+            </a:avLst>
+          </a:prstGeom>
+          <a:ln w="12700">
+            <a:solidFill>
+              <a:schemeClr val="tx1"/>
+            </a:solidFill>
+          </a:ln>
+        </p:spPr>
+        <p:style>
+          <a:lnRef idx="1">
+            <a:schemeClr val="accent1"/>
+          </a:lnRef>
+          <a:fillRef idx="0">
+            <a:schemeClr val="accent1"/>
+          </a:fillRef>
+          <a:effectRef idx="0">
+            <a:schemeClr val="accent1"/>
+          </a:effectRef>
+          <a:fontRef idx="minor">
+            <a:schemeClr val="tx1"/>
+          </a:fontRef>
+        </p:style>
+      </p:cxnSp>
+      <p:sp>
+        <p:nvSpPr>
+          <p:cNvPr id="134" name="Rectángulo 133" descr="Nodo de cuarto nivel&#10;" title="Nodo04"/>
+          <p:cNvSpPr/>
+          <p:nvPr/>
+        </p:nvSpPr>
+        <p:spPr>
+          <a:xfrm>
+            <a:off x="164916" y="4625175"/>
+            <a:ext cx="905694" cy="689404"/>
+          </a:xfrm>
+          <a:prstGeom prst="rect">
+            <a:avLst/>
+          </a:prstGeom>
+          <a:solidFill>
+            <a:schemeClr val="bg1"/>
+          </a:solidFill>
+          <a:ln>
+            <a:solidFill>
+              <a:schemeClr val="tx1"/>
+            </a:solidFill>
+          </a:ln>
+        </p:spPr>
+        <p:style>
+          <a:lnRef idx="2">
+            <a:schemeClr val="accent6"/>
+          </a:lnRef>
+          <a:fillRef idx="1">
+            <a:schemeClr val="lt1"/>
+          </a:fillRef>
+          <a:effectRef idx="0">
+            <a:schemeClr val="accent6"/>
+          </a:effectRef>
+          <a:fontRef idx="minor">
+            <a:schemeClr val="dk1"/>
+          </a:fontRef>
+        </p:style>
+        <p:txBody>
+          <a:bodyPr rtlCol="0" anchor="ctr"/>
+          <a:lstStyle/>
+          <a:p>
+            <a:pPr algn="ctr"/>
+            <a:r>
+              <a:rPr lang="es-ES" sz="900" dirty="0" smtClean="0">
+                <a:solidFill>
+                  <a:schemeClr val="tx1"/>
+                </a:solidFill>
+                <a:latin typeface="Arial" panose="020B0604020202020204" pitchFamily="34" charset="0"/>
+                <a:cs typeface="Arial" panose="020B0604020202020204" pitchFamily="34" charset="0"/>
+              </a:rPr>
+              <a:t>variable independiente si es un elemento del dominio</a:t>
+            </a:r>
+            <a:endParaRPr lang="es-ES" sz="900" dirty="0">
+              <a:solidFill>
+                <a:schemeClr val="tx1"/>
+              </a:solidFill>
+              <a:latin typeface="Arial" panose="020B0604020202020204" pitchFamily="34" charset="0"/>
+              <a:cs typeface="Arial" panose="020B0604020202020204" pitchFamily="34" charset="0"/>
+            </a:endParaRPr>
+          </a:p>
+        </p:txBody>
+      </p:sp>
+      <p:sp>
+        <p:nvSpPr>
+          <p:cNvPr id="137" name="Rectángulo 136" descr="Nodo de cuarto nivel&#10;" title="Nodo04"/>
+          <p:cNvSpPr/>
+          <p:nvPr/>
+        </p:nvSpPr>
+        <p:spPr>
+          <a:xfrm>
+            <a:off x="1151860" y="4626012"/>
+            <a:ext cx="851883" cy="689403"/>
+          </a:xfrm>
+          <a:prstGeom prst="rect">
+            <a:avLst/>
+          </a:prstGeom>
+          <a:solidFill>
+            <a:schemeClr val="bg1"/>
+          </a:solidFill>
+          <a:ln>
+            <a:solidFill>
+              <a:schemeClr val="tx1"/>
+            </a:solidFill>
+          </a:ln>
+        </p:spPr>
+        <p:style>
+          <a:lnRef idx="2">
+            <a:schemeClr val="accent6"/>
+          </a:lnRef>
+          <a:fillRef idx="1">
+            <a:schemeClr val="lt1"/>
+          </a:fillRef>
+          <a:effectRef idx="0">
+            <a:schemeClr val="accent6"/>
+          </a:effectRef>
+          <a:fontRef idx="minor">
+            <a:schemeClr val="dk1"/>
+          </a:fontRef>
+        </p:style>
+        <p:txBody>
+          <a:bodyPr rtlCol="0" anchor="ctr"/>
+          <a:lstStyle/>
+          <a:p>
+            <a:pPr algn="ctr"/>
+            <a:r>
+              <a:rPr lang="es-ES" sz="900" dirty="0">
+                <a:solidFill>
+                  <a:schemeClr val="tx1"/>
+                </a:solidFill>
+                <a:latin typeface="Arial" panose="020B0604020202020204" pitchFamily="34" charset="0"/>
+                <a:cs typeface="Arial" panose="020B0604020202020204" pitchFamily="34" charset="0"/>
+              </a:rPr>
+              <a:t>variable </a:t>
+            </a:r>
+            <a:r>
+              <a:rPr lang="es-ES" sz="900" dirty="0" smtClean="0">
+                <a:solidFill>
+                  <a:schemeClr val="tx1"/>
+                </a:solidFill>
+                <a:latin typeface="Arial" panose="020B0604020202020204" pitchFamily="34" charset="0"/>
+                <a:cs typeface="Arial" panose="020B0604020202020204" pitchFamily="34" charset="0"/>
+              </a:rPr>
+              <a:t>dependiente </a:t>
+            </a:r>
+            <a:r>
+              <a:rPr lang="es-ES" sz="900" dirty="0">
+                <a:solidFill>
+                  <a:schemeClr val="tx1"/>
+                </a:solidFill>
+                <a:latin typeface="Arial" panose="020B0604020202020204" pitchFamily="34" charset="0"/>
+                <a:cs typeface="Arial" panose="020B0604020202020204" pitchFamily="34" charset="0"/>
+              </a:rPr>
+              <a:t>si es un elemento del </a:t>
+            </a:r>
+            <a:r>
+              <a:rPr lang="es-ES" sz="900" dirty="0" err="1" smtClean="0">
+                <a:solidFill>
+                  <a:schemeClr val="tx1"/>
+                </a:solidFill>
+                <a:latin typeface="Arial" panose="020B0604020202020204" pitchFamily="34" charset="0"/>
+                <a:cs typeface="Arial" panose="020B0604020202020204" pitchFamily="34" charset="0"/>
+              </a:rPr>
+              <a:t>codominio</a:t>
+            </a:r>
+            <a:endParaRPr lang="es-ES" sz="900" dirty="0">
+              <a:solidFill>
+                <a:schemeClr val="tx1"/>
+              </a:solidFill>
+              <a:latin typeface="Arial" panose="020B0604020202020204" pitchFamily="34" charset="0"/>
+              <a:cs typeface="Arial" panose="020B0604020202020204" pitchFamily="34" charset="0"/>
+            </a:endParaRPr>
+          </a:p>
+        </p:txBody>
+      </p:sp>
+      <p:sp>
+        <p:nvSpPr>
+          <p:cNvPr id="140" name="CuadroTexto 139" descr="Conector entre nodos" title="conector"/>
+          <p:cNvSpPr txBox="1"/>
+          <p:nvPr/>
+        </p:nvSpPr>
+        <p:spPr>
+          <a:xfrm>
+            <a:off x="1443743" y="1713212"/>
+            <a:ext cx="1418919" cy="230832"/>
+          </a:xfrm>
+          <a:prstGeom prst="rect">
+            <a:avLst/>
+          </a:prstGeom>
+          <a:noFill/>
+        </p:spPr>
+        <p:txBody>
+          <a:bodyPr wrap="square" rtlCol="0">
+            <a:spAutoFit/>
+          </a:bodyPr>
+          <a:lstStyle/>
+          <a:p>
+            <a:pPr algn="ctr"/>
+            <a:r>
+              <a:rPr lang="es-ES" sz="900" dirty="0" smtClean="0">
+                <a:latin typeface="Arial" panose="020B0604020202020204" pitchFamily="34" charset="0"/>
+                <a:cs typeface="Arial" panose="020B0604020202020204" pitchFamily="34" charset="0"/>
+              </a:rPr>
+              <a:t>se representan en</a:t>
+            </a:r>
+            <a:endParaRPr lang="es-ES" sz="900" dirty="0">
+              <a:latin typeface="Arial" panose="020B0604020202020204" pitchFamily="34" charset="0"/>
+              <a:cs typeface="Arial" panose="020B0604020202020204" pitchFamily="34" charset="0"/>
+            </a:endParaRPr>
+          </a:p>
+        </p:txBody>
+      </p:sp>
+      <p:sp>
+        <p:nvSpPr>
+          <p:cNvPr id="142" name="Rectángulo 141" descr="Nodo de segundo nivel" title="Nodo02"/>
+          <p:cNvSpPr/>
+          <p:nvPr/>
+        </p:nvSpPr>
+        <p:spPr>
+          <a:xfrm>
+            <a:off x="1717578" y="2036094"/>
+            <a:ext cx="950461" cy="475392"/>
+          </a:xfrm>
+          <a:prstGeom prst="rect">
+            <a:avLst/>
+          </a:prstGeom>
+          <a:solidFill>
+            <a:schemeClr val="bg2">
+              <a:lumMod val="50000"/>
+            </a:schemeClr>
+          </a:solidFill>
+          <a:ln>
+            <a:solidFill>
+              <a:schemeClr val="tx1"/>
+            </a:solidFill>
+          </a:ln>
+        </p:spPr>
+        <p:style>
+          <a:lnRef idx="2">
+            <a:schemeClr val="accent6"/>
+          </a:lnRef>
+          <a:fillRef idx="1">
+            <a:schemeClr val="lt1"/>
+          </a:fillRef>
+          <a:effectRef idx="0">
+            <a:schemeClr val="accent6"/>
+          </a:effectRef>
+          <a:fontRef idx="minor">
+            <a:schemeClr val="dk1"/>
+          </a:fontRef>
+        </p:style>
+        <p:txBody>
+          <a:bodyPr rtlCol="0" anchor="ctr"/>
+          <a:lstStyle/>
+          <a:p>
+            <a:pPr marL="171450" indent="-171450">
+              <a:buFont typeface="Arial" panose="020B0604020202020204" pitchFamily="34" charset="0"/>
+              <a:buChar char="•"/>
+            </a:pPr>
+            <a:r>
+              <a:rPr lang="es-ES" sz="900" dirty="0" smtClean="0">
+                <a:solidFill>
+                  <a:schemeClr val="bg1"/>
+                </a:solidFill>
+                <a:latin typeface="Arial" panose="020B0604020202020204" pitchFamily="34" charset="0"/>
+                <a:cs typeface="Arial" panose="020B0604020202020204" pitchFamily="34" charset="0"/>
+              </a:rPr>
+              <a:t>gráficas</a:t>
+            </a:r>
+            <a:endParaRPr lang="es-ES" sz="900" dirty="0">
+              <a:solidFill>
+                <a:schemeClr val="bg1"/>
+              </a:solidFill>
+              <a:latin typeface="Arial" panose="020B0604020202020204" pitchFamily="34" charset="0"/>
+              <a:cs typeface="Arial" panose="020B0604020202020204" pitchFamily="34" charset="0"/>
+            </a:endParaRPr>
+          </a:p>
+          <a:p>
+            <a:pPr marL="171450" indent="-171450">
+              <a:buFont typeface="Arial" panose="020B0604020202020204" pitchFamily="34" charset="0"/>
+              <a:buChar char="•"/>
+            </a:pPr>
+            <a:r>
+              <a:rPr lang="es-ES" sz="900" dirty="0">
+                <a:solidFill>
+                  <a:schemeClr val="bg1"/>
+                </a:solidFill>
+                <a:latin typeface="Arial" panose="020B0604020202020204" pitchFamily="34" charset="0"/>
+                <a:cs typeface="Arial" panose="020B0604020202020204" pitchFamily="34" charset="0"/>
+              </a:rPr>
+              <a:t>tablas</a:t>
+            </a:r>
+          </a:p>
+          <a:p>
+            <a:pPr marL="171450" indent="-171450">
+              <a:buFont typeface="Arial" panose="020B0604020202020204" pitchFamily="34" charset="0"/>
+              <a:buChar char="•"/>
+            </a:pPr>
+            <a:r>
+              <a:rPr lang="es-ES" sz="900" dirty="0">
+                <a:solidFill>
+                  <a:schemeClr val="bg1"/>
+                </a:solidFill>
+                <a:latin typeface="Arial" panose="020B0604020202020204" pitchFamily="34" charset="0"/>
+                <a:cs typeface="Arial" panose="020B0604020202020204" pitchFamily="34" charset="0"/>
+              </a:rPr>
+              <a:t>fórmulas</a:t>
+            </a:r>
+          </a:p>
+        </p:txBody>
+      </p:sp>
+      <p:cxnSp>
+        <p:nvCxnSpPr>
+          <p:cNvPr id="164" name="Conector angular 163"/>
+          <p:cNvCxnSpPr/>
+          <p:nvPr/>
+        </p:nvCxnSpPr>
+        <p:spPr>
+          <a:xfrm>
+            <a:off x="4104577" y="3935174"/>
+            <a:ext cx="945126" cy="143720"/>
+          </a:xfrm>
+          <a:prstGeom prst="bentConnector2">
+            <a:avLst/>
+          </a:prstGeom>
+          <a:ln w="12700">
+            <a:solidFill>
+              <a:schemeClr val="tx1"/>
+            </a:solidFill>
+          </a:ln>
+        </p:spPr>
+        <p:style>
+          <a:lnRef idx="1">
+            <a:schemeClr val="accent1"/>
+          </a:lnRef>
+          <a:fillRef idx="0">
+            <a:schemeClr val="accent1"/>
+          </a:fillRef>
+          <a:effectRef idx="0">
+            <a:schemeClr val="accent1"/>
+          </a:effectRef>
+          <a:fontRef idx="minor">
+            <a:schemeClr val="tx1"/>
+          </a:fontRef>
+        </p:style>
+      </p:cxnSp>
+      <p:cxnSp>
+        <p:nvCxnSpPr>
+          <p:cNvPr id="182" name="Conector angular 181"/>
+          <p:cNvCxnSpPr/>
+          <p:nvPr/>
+        </p:nvCxnSpPr>
+        <p:spPr>
+          <a:xfrm flipV="1">
+            <a:off x="6131577" y="4065840"/>
+            <a:ext cx="904650" cy="1399"/>
+          </a:xfrm>
+          <a:prstGeom prst="bentConnector4">
+            <a:avLst>
+              <a:gd name="adj1" fmla="val -695"/>
+              <a:gd name="adj2" fmla="val 9451608"/>
+            </a:avLst>
+          </a:prstGeom>
+          <a:ln w="12700">
+            <a:solidFill>
+              <a:schemeClr val="tx1"/>
+            </a:solidFill>
+          </a:ln>
+        </p:spPr>
+        <p:style>
+          <a:lnRef idx="1">
+            <a:schemeClr val="accent1"/>
+          </a:lnRef>
+          <a:fillRef idx="0">
+            <a:schemeClr val="accent1"/>
+          </a:fillRef>
+          <a:effectRef idx="0">
+            <a:schemeClr val="accent1"/>
+          </a:effectRef>
+          <a:fontRef idx="minor">
+            <a:schemeClr val="tx1"/>
+          </a:fontRef>
+        </p:style>
+      </p:cxnSp>
+      <p:cxnSp>
+        <p:nvCxnSpPr>
+          <p:cNvPr id="193" name="Conector angular 192"/>
+          <p:cNvCxnSpPr/>
+          <p:nvPr/>
+        </p:nvCxnSpPr>
+        <p:spPr>
+          <a:xfrm rot="16200000" flipV="1">
+            <a:off x="4037539" y="4433786"/>
+            <a:ext cx="131364" cy="4709"/>
+          </a:xfrm>
+          <a:prstGeom prst="bentConnector3">
+            <a:avLst>
+              <a:gd name="adj1" fmla="val 103543"/>
+            </a:avLst>
+          </a:prstGeom>
+          <a:ln w="12700">
+            <a:solidFill>
+              <a:schemeClr val="tx1"/>
+            </a:solidFill>
+          </a:ln>
+        </p:spPr>
+        <p:style>
+          <a:lnRef idx="1">
+            <a:schemeClr val="accent1"/>
+          </a:lnRef>
+          <a:fillRef idx="0">
+            <a:schemeClr val="accent1"/>
+          </a:fillRef>
+          <a:effectRef idx="0">
+            <a:schemeClr val="accent1"/>
+          </a:effectRef>
+          <a:fontRef idx="minor">
+            <a:schemeClr val="tx1"/>
+          </a:fontRef>
+        </p:style>
+      </p:cxnSp>
+      <p:cxnSp>
+        <p:nvCxnSpPr>
+          <p:cNvPr id="208" name="Conector angular 207"/>
+          <p:cNvCxnSpPr/>
+          <p:nvPr/>
+        </p:nvCxnSpPr>
+        <p:spPr>
+          <a:xfrm rot="16200000" flipV="1">
+            <a:off x="3045131" y="4429221"/>
+            <a:ext cx="131364" cy="4709"/>
+          </a:xfrm>
+          <a:prstGeom prst="bentConnector3">
+            <a:avLst>
+              <a:gd name="adj1" fmla="val 103543"/>
+            </a:avLst>
+          </a:prstGeom>
+          <a:ln w="12700">
+            <a:solidFill>
+              <a:schemeClr val="tx1"/>
+            </a:solidFill>
+          </a:ln>
+        </p:spPr>
+        <p:style>
+          <a:lnRef idx="1">
+            <a:schemeClr val="accent1"/>
+          </a:lnRef>
+          <a:fillRef idx="0">
+            <a:schemeClr val="accent1"/>
+          </a:fillRef>
+          <a:effectRef idx="0">
+            <a:schemeClr val="accent1"/>
+          </a:effectRef>
+          <a:fontRef idx="minor">
+            <a:schemeClr val="tx1"/>
+          </a:fontRef>
+        </p:style>
+      </p:cxnSp>
+      <p:cxnSp>
+        <p:nvCxnSpPr>
+          <p:cNvPr id="213" name="Conector angular 212"/>
+          <p:cNvCxnSpPr/>
+          <p:nvPr/>
+        </p:nvCxnSpPr>
+        <p:spPr>
+          <a:xfrm rot="16200000" flipH="1">
+            <a:off x="3017325" y="4751623"/>
+            <a:ext cx="182266" cy="8382"/>
+          </a:xfrm>
+          <a:prstGeom prst="bentConnector3">
+            <a:avLst>
+              <a:gd name="adj1" fmla="val 100362"/>
+            </a:avLst>
+          </a:prstGeom>
+          <a:ln w="12700">
+            <a:solidFill>
+              <a:schemeClr val="tx1"/>
+            </a:solidFill>
+          </a:ln>
+        </p:spPr>
+        <p:style>
+          <a:lnRef idx="1">
+            <a:schemeClr val="accent1"/>
+          </a:lnRef>
+          <a:fillRef idx="0">
+            <a:schemeClr val="accent1"/>
+          </a:fillRef>
+          <a:effectRef idx="0">
+            <a:schemeClr val="accent1"/>
+          </a:effectRef>
+          <a:fontRef idx="minor">
+            <a:schemeClr val="tx1"/>
+          </a:fontRef>
+        </p:style>
+      </p:cxnSp>
+      <p:cxnSp>
+        <p:nvCxnSpPr>
+          <p:cNvPr id="219" name="Conector angular 218"/>
+          <p:cNvCxnSpPr/>
+          <p:nvPr/>
+        </p:nvCxnSpPr>
+        <p:spPr>
+          <a:xfrm rot="16200000" flipV="1">
+            <a:off x="4987801" y="4428777"/>
+            <a:ext cx="131364" cy="4709"/>
+          </a:xfrm>
+          <a:prstGeom prst="bentConnector3">
+            <a:avLst>
+              <a:gd name="adj1" fmla="val 103543"/>
+            </a:avLst>
+          </a:prstGeom>
+          <a:ln w="12700">
+            <a:solidFill>
+              <a:schemeClr val="tx1"/>
+            </a:solidFill>
+          </a:ln>
+        </p:spPr>
+        <p:style>
+          <a:lnRef idx="1">
+            <a:schemeClr val="accent1"/>
+          </a:lnRef>
+          <a:fillRef idx="0">
+            <a:schemeClr val="accent1"/>
+          </a:fillRef>
+          <a:effectRef idx="0">
+            <a:schemeClr val="accent1"/>
+          </a:effectRef>
+          <a:fontRef idx="minor">
+            <a:schemeClr val="tx1"/>
+          </a:fontRef>
+        </p:style>
+      </p:cxnSp>
+      <p:cxnSp>
+        <p:nvCxnSpPr>
+          <p:cNvPr id="221" name="Conector angular 220"/>
+          <p:cNvCxnSpPr/>
+          <p:nvPr/>
+        </p:nvCxnSpPr>
+        <p:spPr>
+          <a:xfrm rot="16200000" flipV="1">
+            <a:off x="5006575" y="4782270"/>
+            <a:ext cx="131364" cy="4709"/>
+          </a:xfrm>
+          <a:prstGeom prst="bentConnector3">
+            <a:avLst>
+              <a:gd name="adj1" fmla="val -6649"/>
+            </a:avLst>
+          </a:prstGeom>
+          <a:ln w="12700">
+            <a:solidFill>
+              <a:schemeClr val="tx1"/>
+            </a:solidFill>
+          </a:ln>
+        </p:spPr>
+        <p:style>
+          <a:lnRef idx="1">
+            <a:schemeClr val="accent1"/>
+          </a:lnRef>
+          <a:fillRef idx="0">
+            <a:schemeClr val="accent1"/>
+          </a:fillRef>
+          <a:effectRef idx="0">
+            <a:schemeClr val="accent1"/>
+          </a:effectRef>
+          <a:fontRef idx="minor">
+            <a:schemeClr val="tx1"/>
+          </a:fontRef>
+        </p:style>
+      </p:cxnSp>
+      <p:cxnSp>
+        <p:nvCxnSpPr>
+          <p:cNvPr id="269" name="Conector angular 268"/>
+          <p:cNvCxnSpPr/>
+          <p:nvPr/>
+        </p:nvCxnSpPr>
+        <p:spPr>
+          <a:xfrm rot="16200000" flipV="1">
+            <a:off x="5042002" y="6167020"/>
+            <a:ext cx="131364" cy="4709"/>
+          </a:xfrm>
+          <a:prstGeom prst="bentConnector3">
+            <a:avLst>
+              <a:gd name="adj1" fmla="val -1061"/>
+            </a:avLst>
+          </a:prstGeom>
+          <a:ln w="12700">
+            <a:solidFill>
+              <a:schemeClr val="tx1"/>
+            </a:solidFill>
+          </a:ln>
+        </p:spPr>
+        <p:style>
+          <a:lnRef idx="1">
+            <a:schemeClr val="accent1"/>
+          </a:lnRef>
+          <a:fillRef idx="0">
+            <a:schemeClr val="accent1"/>
+          </a:fillRef>
+          <a:effectRef idx="0">
+            <a:schemeClr val="accent1"/>
+          </a:effectRef>
+          <a:fontRef idx="minor">
+            <a:schemeClr val="tx1"/>
+          </a:fontRef>
+        </p:style>
+      </p:cxnSp>
+      <p:cxnSp>
+        <p:nvCxnSpPr>
+          <p:cNvPr id="273" name="Conector angular 272"/>
+          <p:cNvCxnSpPr/>
+          <p:nvPr/>
+        </p:nvCxnSpPr>
+        <p:spPr>
+          <a:xfrm rot="16200000" flipV="1">
+            <a:off x="5040163" y="5857679"/>
+            <a:ext cx="131364" cy="4709"/>
+          </a:xfrm>
+          <a:prstGeom prst="bentConnector3">
+            <a:avLst>
+              <a:gd name="adj1" fmla="val 105441"/>
+            </a:avLst>
+          </a:prstGeom>
+          <a:ln w="12700">
+            <a:solidFill>
+              <a:schemeClr val="tx1"/>
+            </a:solidFill>
+          </a:ln>
+        </p:spPr>
+        <p:style>
+          <a:lnRef idx="1">
+            <a:schemeClr val="accent1"/>
+          </a:lnRef>
+          <a:fillRef idx="0">
+            <a:schemeClr val="accent1"/>
+          </a:fillRef>
+          <a:effectRef idx="0">
+            <a:schemeClr val="accent1"/>
+          </a:effectRef>
+          <a:fontRef idx="minor">
+            <a:schemeClr val="tx1"/>
+          </a:fontRef>
+        </p:style>
+      </p:cxnSp>
+      <p:cxnSp>
+        <p:nvCxnSpPr>
+          <p:cNvPr id="282" name="Conector angular 281"/>
+          <p:cNvCxnSpPr/>
+          <p:nvPr/>
+        </p:nvCxnSpPr>
+        <p:spPr>
+          <a:xfrm rot="16200000" flipH="1">
+            <a:off x="909291" y="1978841"/>
+            <a:ext cx="106251" cy="3461"/>
+          </a:xfrm>
+          <a:prstGeom prst="bentConnector3">
+            <a:avLst>
+              <a:gd name="adj1" fmla="val -3525"/>
+            </a:avLst>
+          </a:prstGeom>
+          <a:ln w="12700">
+            <a:solidFill>
+              <a:schemeClr val="tx1"/>
+            </a:solidFill>
+          </a:ln>
+        </p:spPr>
+        <p:style>
+          <a:lnRef idx="1">
+            <a:schemeClr val="accent1"/>
+          </a:lnRef>
+          <a:fillRef idx="0">
+            <a:schemeClr val="accent1"/>
+          </a:fillRef>
+          <a:effectRef idx="0">
+            <a:schemeClr val="accent1"/>
+          </a:effectRef>
+          <a:fontRef idx="minor">
+            <a:schemeClr val="tx1"/>
+          </a:fontRef>
+        </p:style>
+      </p:cxnSp>
+      <p:cxnSp>
+        <p:nvCxnSpPr>
+          <p:cNvPr id="283" name="Conector angular 282"/>
+          <p:cNvCxnSpPr/>
+          <p:nvPr/>
+        </p:nvCxnSpPr>
+        <p:spPr>
+          <a:xfrm rot="5400000">
+            <a:off x="857673" y="2642917"/>
+            <a:ext cx="205662" cy="363"/>
+          </a:xfrm>
+          <a:prstGeom prst="bentConnector3">
+            <a:avLst>
+              <a:gd name="adj1" fmla="val 50000"/>
+            </a:avLst>
+          </a:prstGeom>
+          <a:ln w="12700">
+            <a:solidFill>
+              <a:schemeClr val="tx1"/>
+            </a:solidFill>
+          </a:ln>
+        </p:spPr>
+        <p:style>
+          <a:lnRef idx="1">
+            <a:schemeClr val="accent1"/>
+          </a:lnRef>
+          <a:fillRef idx="0">
+            <a:schemeClr val="accent1"/>
+          </a:fillRef>
+          <a:effectRef idx="0">
+            <a:schemeClr val="accent1"/>
+          </a:effectRef>
+          <a:fontRef idx="minor">
+            <a:schemeClr val="tx1"/>
+          </a:fontRef>
+        </p:style>
+      </p:cxnSp>
+      <p:cxnSp>
+        <p:nvCxnSpPr>
+          <p:cNvPr id="284" name="Conector angular 283"/>
+          <p:cNvCxnSpPr/>
+          <p:nvPr/>
+        </p:nvCxnSpPr>
+        <p:spPr>
+          <a:xfrm rot="16200000" flipH="1">
+            <a:off x="905466" y="2958011"/>
+            <a:ext cx="106251" cy="3461"/>
+          </a:xfrm>
+          <a:prstGeom prst="bentConnector3">
+            <a:avLst>
+              <a:gd name="adj1" fmla="val -3525"/>
+            </a:avLst>
+          </a:prstGeom>
+          <a:ln w="12700">
+            <a:solidFill>
+              <a:schemeClr val="tx1"/>
+            </a:solidFill>
+          </a:ln>
+        </p:spPr>
+        <p:style>
+          <a:lnRef idx="1">
+            <a:schemeClr val="accent1"/>
+          </a:lnRef>
+          <a:fillRef idx="0">
+            <a:schemeClr val="accent1"/>
+          </a:fillRef>
+          <a:effectRef idx="0">
+            <a:schemeClr val="accent1"/>
+          </a:effectRef>
+          <a:fontRef idx="minor">
+            <a:schemeClr val="tx1"/>
+          </a:fontRef>
+        </p:style>
+      </p:cxnSp>
+      <p:cxnSp>
+        <p:nvCxnSpPr>
+          <p:cNvPr id="285" name="Conector angular 284"/>
+          <p:cNvCxnSpPr/>
+          <p:nvPr/>
+        </p:nvCxnSpPr>
+        <p:spPr>
+          <a:xfrm rot="16200000" flipH="1">
+            <a:off x="931384" y="4214824"/>
+            <a:ext cx="106251" cy="3461"/>
+          </a:xfrm>
+          <a:prstGeom prst="bentConnector3">
+            <a:avLst>
+              <a:gd name="adj1" fmla="val -3525"/>
+            </a:avLst>
+          </a:prstGeom>
+          <a:ln w="12700">
+            <a:solidFill>
+              <a:schemeClr val="tx1"/>
+            </a:solidFill>
+          </a:ln>
+        </p:spPr>
+        <p:style>
+          <a:lnRef idx="1">
+            <a:schemeClr val="accent1"/>
+          </a:lnRef>
+          <a:fillRef idx="0">
+            <a:schemeClr val="accent1"/>
+          </a:fillRef>
+          <a:effectRef idx="0">
+            <a:schemeClr val="accent1"/>
+          </a:effectRef>
+          <a:fontRef idx="minor">
+            <a:schemeClr val="tx1"/>
+          </a:fontRef>
+        </p:style>
+      </p:cxnSp>
+      <p:cxnSp>
+        <p:nvCxnSpPr>
+          <p:cNvPr id="286" name="Conector angular 285"/>
+          <p:cNvCxnSpPr/>
+          <p:nvPr/>
+        </p:nvCxnSpPr>
+        <p:spPr>
+          <a:xfrm rot="16200000" flipH="1">
+            <a:off x="918791" y="4440305"/>
+            <a:ext cx="106251" cy="3461"/>
+          </a:xfrm>
+          <a:prstGeom prst="bentConnector3">
+            <a:avLst>
+              <a:gd name="adj1" fmla="val -3525"/>
+            </a:avLst>
+          </a:prstGeom>
+          <a:ln w="12700">
+            <a:solidFill>
+              <a:schemeClr val="tx1"/>
+            </a:solidFill>
+          </a:ln>
+        </p:spPr>
+        <p:style>
+          <a:lnRef idx="1">
+            <a:schemeClr val="accent1"/>
+          </a:lnRef>
+          <a:fillRef idx="0">
+            <a:schemeClr val="accent1"/>
+          </a:fillRef>
+          <a:effectRef idx="0">
+            <a:schemeClr val="accent1"/>
+          </a:effectRef>
+          <a:fontRef idx="minor">
+            <a:schemeClr val="tx1"/>
+          </a:fontRef>
+        </p:style>
+      </p:cxnSp>
+      <p:cxnSp>
+        <p:nvCxnSpPr>
+          <p:cNvPr id="288" name="Conector angular 287"/>
+          <p:cNvCxnSpPr/>
+          <p:nvPr/>
+        </p:nvCxnSpPr>
+        <p:spPr>
+          <a:xfrm rot="5400000" flipH="1" flipV="1">
+            <a:off x="1463601" y="1258468"/>
+            <a:ext cx="5257" cy="1004164"/>
+          </a:xfrm>
+          <a:prstGeom prst="bentConnector3">
+            <a:avLst>
+              <a:gd name="adj1" fmla="val 2371562"/>
+            </a:avLst>
+          </a:prstGeom>
+          <a:ln w="12700">
+            <a:solidFill>
+              <a:schemeClr val="tx1"/>
+            </a:solidFill>
+          </a:ln>
+        </p:spPr>
+        <p:style>
+          <a:lnRef idx="1">
+            <a:schemeClr val="accent1"/>
+          </a:lnRef>
+          <a:fillRef idx="0">
+            <a:schemeClr val="accent1"/>
+          </a:fillRef>
+          <a:effectRef idx="0">
+            <a:schemeClr val="accent1"/>
+          </a:effectRef>
+          <a:fontRef idx="minor">
+            <a:schemeClr val="tx1"/>
+          </a:fontRef>
+        </p:style>
+      </p:cxnSp>
+      <p:cxnSp>
+        <p:nvCxnSpPr>
+          <p:cNvPr id="289" name="Conector angular 288"/>
+          <p:cNvCxnSpPr>
+            <a:stCxn id="130" idx="2"/>
+          </p:cNvCxnSpPr>
+          <p:nvPr/>
+        </p:nvCxnSpPr>
+        <p:spPr>
+          <a:xfrm rot="5400000">
+            <a:off x="1337309" y="1063512"/>
+            <a:ext cx="215964" cy="9983"/>
+          </a:xfrm>
+          <a:prstGeom prst="bentConnector3">
+            <a:avLst>
+              <a:gd name="adj1" fmla="val 97633"/>
+            </a:avLst>
+          </a:prstGeom>
+          <a:ln w="12700">
+            <a:solidFill>
+              <a:schemeClr val="tx1"/>
+            </a:solidFill>
+          </a:ln>
+        </p:spPr>
+        <p:style>
+          <a:lnRef idx="1">
+            <a:schemeClr val="accent1"/>
+          </a:lnRef>
+          <a:fillRef idx="0">
+            <a:schemeClr val="accent1"/>
+          </a:fillRef>
+          <a:effectRef idx="0">
+            <a:schemeClr val="accent1"/>
+          </a:effectRef>
+          <a:fontRef idx="minor">
+            <a:schemeClr val="tx1"/>
+          </a:fontRef>
+        </p:style>
+      </p:cxnSp>
+      <p:cxnSp>
+        <p:nvCxnSpPr>
+          <p:cNvPr id="290" name="Conector angular 289"/>
+          <p:cNvCxnSpPr/>
+          <p:nvPr/>
+        </p:nvCxnSpPr>
+        <p:spPr>
+          <a:xfrm rot="16200000" flipH="1">
+            <a:off x="1896024" y="1971321"/>
+            <a:ext cx="106251" cy="3461"/>
+          </a:xfrm>
+          <a:prstGeom prst="bentConnector3">
+            <a:avLst>
+              <a:gd name="adj1" fmla="val -3525"/>
+            </a:avLst>
+          </a:prstGeom>
+          <a:ln w="12700">
+            <a:solidFill>
+              <a:schemeClr val="tx1"/>
+            </a:solidFill>
+          </a:ln>
+        </p:spPr>
+        <p:style>
+          <a:lnRef idx="1">
+            <a:schemeClr val="accent1"/>
+          </a:lnRef>
+          <a:fillRef idx="0">
+            <a:schemeClr val="accent1"/>
+          </a:fillRef>
+          <a:effectRef idx="0">
+            <a:schemeClr val="accent1"/>
+          </a:effectRef>
+          <a:fontRef idx="minor">
+            <a:schemeClr val="tx1"/>
+          </a:fontRef>
+        </p:style>
+      </p:cxnSp>
+      <p:cxnSp>
+        <p:nvCxnSpPr>
+          <p:cNvPr id="291" name="Conector angular 290"/>
+          <p:cNvCxnSpPr/>
+          <p:nvPr/>
+        </p:nvCxnSpPr>
+        <p:spPr>
+          <a:xfrm rot="16200000" flipH="1">
+            <a:off x="1355163" y="1547566"/>
+            <a:ext cx="173699" cy="3461"/>
+          </a:xfrm>
+          <a:prstGeom prst="bentConnector3">
+            <a:avLst>
+              <a:gd name="adj1" fmla="val -7029"/>
+            </a:avLst>
+          </a:prstGeom>
+          <a:ln w="12700">
+            <a:solidFill>
+              <a:schemeClr val="tx1"/>
+            </a:solidFill>
+          </a:ln>
+        </p:spPr>
+        <p:style>
+          <a:lnRef idx="1">
+            <a:schemeClr val="accent1"/>
+          </a:lnRef>
+          <a:fillRef idx="0">
+            <a:schemeClr val="accent1"/>
+          </a:fillRef>
+          <a:effectRef idx="0">
+            <a:schemeClr val="accent1"/>
+          </a:effectRef>
+          <a:fontRef idx="minor">
+            <a:schemeClr val="tx1"/>
+          </a:fontRef>
+        </p:style>
+      </p:cxnSp>
+      <p:cxnSp>
+        <p:nvCxnSpPr>
+          <p:cNvPr id="292" name="Conector angular 291"/>
+          <p:cNvCxnSpPr/>
+          <p:nvPr/>
+        </p:nvCxnSpPr>
+        <p:spPr>
+          <a:xfrm rot="5400000">
+            <a:off x="7033260" y="971895"/>
+            <a:ext cx="104220" cy="4291"/>
+          </a:xfrm>
+          <a:prstGeom prst="bentConnector3">
+            <a:avLst>
+              <a:gd name="adj1" fmla="val 1789"/>
             </a:avLst>
           </a:prstGeom>
           <a:ln w="12700">

</xml_diff>